<commit_message>
frantic edits to chico ppt
</commit_message>
<xml_diff>
--- a/chico-specific/Chico presentation.pptx
+++ b/chico-specific/Chico presentation.pptx
@@ -5,7 +5,7 @@
     <p:sldMasterId id="2147483648" r:id="rId1"/>
   </p:sldMasterIdLst>
   <p:notesMasterIdLst>
-    <p:notesMasterId r:id="rId43"/>
+    <p:notesMasterId r:id="rId41"/>
   </p:notesMasterIdLst>
   <p:sldIdLst>
     <p:sldId id="256" r:id="rId2"/>
@@ -16,39 +16,37 @@
     <p:sldId id="287" r:id="rId7"/>
     <p:sldId id="259" r:id="rId8"/>
     <p:sldId id="288" r:id="rId9"/>
-    <p:sldId id="289" r:id="rId10"/>
-    <p:sldId id="292" r:id="rId11"/>
-    <p:sldId id="275" r:id="rId12"/>
-    <p:sldId id="270" r:id="rId13"/>
-    <p:sldId id="293" r:id="rId14"/>
-    <p:sldId id="298" r:id="rId15"/>
-    <p:sldId id="291" r:id="rId16"/>
-    <p:sldId id="260" r:id="rId17"/>
-    <p:sldId id="261" r:id="rId18"/>
-    <p:sldId id="271" r:id="rId19"/>
-    <p:sldId id="272" r:id="rId20"/>
-    <p:sldId id="273" r:id="rId21"/>
-    <p:sldId id="277" r:id="rId22"/>
-    <p:sldId id="285" r:id="rId23"/>
-    <p:sldId id="300" r:id="rId24"/>
-    <p:sldId id="279" r:id="rId25"/>
-    <p:sldId id="299" r:id="rId26"/>
-    <p:sldId id="278" r:id="rId27"/>
-    <p:sldId id="264" r:id="rId28"/>
-    <p:sldId id="295" r:id="rId29"/>
-    <p:sldId id="301" r:id="rId30"/>
-    <p:sldId id="280" r:id="rId31"/>
-    <p:sldId id="265" r:id="rId32"/>
-    <p:sldId id="268" r:id="rId33"/>
-    <p:sldId id="267" r:id="rId34"/>
-    <p:sldId id="269" r:id="rId35"/>
-    <p:sldId id="274" r:id="rId36"/>
-    <p:sldId id="303" r:id="rId37"/>
-    <p:sldId id="282" r:id="rId38"/>
-    <p:sldId id="304" r:id="rId39"/>
-    <p:sldId id="283" r:id="rId40"/>
-    <p:sldId id="297" r:id="rId41"/>
-    <p:sldId id="286" r:id="rId42"/>
+    <p:sldId id="292" r:id="rId10"/>
+    <p:sldId id="275" r:id="rId11"/>
+    <p:sldId id="270" r:id="rId12"/>
+    <p:sldId id="293" r:id="rId13"/>
+    <p:sldId id="277" r:id="rId14"/>
+    <p:sldId id="285" r:id="rId15"/>
+    <p:sldId id="300" r:id="rId16"/>
+    <p:sldId id="279" r:id="rId17"/>
+    <p:sldId id="299" r:id="rId18"/>
+    <p:sldId id="278" r:id="rId19"/>
+    <p:sldId id="298" r:id="rId20"/>
+    <p:sldId id="291" r:id="rId21"/>
+    <p:sldId id="261" r:id="rId22"/>
+    <p:sldId id="271" r:id="rId23"/>
+    <p:sldId id="272" r:id="rId24"/>
+    <p:sldId id="273" r:id="rId25"/>
+    <p:sldId id="264" r:id="rId26"/>
+    <p:sldId id="295" r:id="rId27"/>
+    <p:sldId id="301" r:id="rId28"/>
+    <p:sldId id="280" r:id="rId29"/>
+    <p:sldId id="265" r:id="rId30"/>
+    <p:sldId id="268" r:id="rId31"/>
+    <p:sldId id="267" r:id="rId32"/>
+    <p:sldId id="269" r:id="rId33"/>
+    <p:sldId id="274" r:id="rId34"/>
+    <p:sldId id="303" r:id="rId35"/>
+    <p:sldId id="282" r:id="rId36"/>
+    <p:sldId id="304" r:id="rId37"/>
+    <p:sldId id="283" r:id="rId38"/>
+    <p:sldId id="297" r:id="rId39"/>
+    <p:sldId id="286" r:id="rId40"/>
   </p:sldIdLst>
   <p:sldSz cx="12192000" cy="6858000"/>
   <p:notesSz cx="6858000" cy="9144000"/>
@@ -164,24 +162,22 @@
             <p14:sldId id="287"/>
             <p14:sldId id="259"/>
             <p14:sldId id="288"/>
-            <p14:sldId id="289"/>
             <p14:sldId id="292"/>
             <p14:sldId id="275"/>
             <p14:sldId id="270"/>
             <p14:sldId id="293"/>
-            <p14:sldId id="298"/>
-            <p14:sldId id="291"/>
-            <p14:sldId id="260"/>
-            <p14:sldId id="261"/>
-            <p14:sldId id="271"/>
-            <p14:sldId id="272"/>
-            <p14:sldId id="273"/>
             <p14:sldId id="277"/>
             <p14:sldId id="285"/>
             <p14:sldId id="300"/>
             <p14:sldId id="279"/>
             <p14:sldId id="299"/>
             <p14:sldId id="278"/>
+            <p14:sldId id="298"/>
+            <p14:sldId id="291"/>
+            <p14:sldId id="261"/>
+            <p14:sldId id="271"/>
+            <p14:sldId id="272"/>
+            <p14:sldId id="273"/>
             <p14:sldId id="264"/>
             <p14:sldId id="295"/>
             <p14:sldId id="301"/>
@@ -601,29 +597,6 @@
           <a:bodyPr/>
           <a:lstStyle/>
           <a:p>
-            <a:pPr marL="0" marR="0" lvl="0" indent="0" algn="l" defTabSz="914400" rtl="0" eaLnBrk="1" fontAlgn="auto" latinLnBrk="0" hangingPunct="1">
-              <a:lnSpc>
-                <a:spcPct val="100000"/>
-              </a:lnSpc>
-              <a:spcBef>
-                <a:spcPts val="0"/>
-              </a:spcBef>
-              <a:spcAft>
-                <a:spcPts val="0"/>
-              </a:spcAft>
-              <a:buClrTx/>
-              <a:buSzTx/>
-              <a:buFontTx/>
-              <a:buNone/>
-              <a:tabLst/>
-              <a:defRPr/>
-            </a:pPr>
-            <a:r>
-              <a:rPr lang="en-US" dirty="0"/>
-              <a:t>There are mechanisms for reconsideration</a:t>
-            </a:r>
-          </a:p>
-          <a:p>
             <a:endParaRPr lang="en-US" dirty="0"/>
           </a:p>
         </p:txBody>
@@ -645,7 +618,7 @@
           <a:p>
             <a:fld id="{FAFB6825-279C-2745-85D9-F734AAE5F76F}" type="slidenum">
               <a:rPr lang="en-US" smtClean="0"/>
-              <a:t>13</a:t>
+              <a:t>12</a:t>
             </a:fld>
             <a:endParaRPr lang="en-US"/>
           </a:p>
@@ -708,49 +681,6 @@
           <a:bodyPr/>
           <a:lstStyle/>
           <a:p>
-            <a:pPr marL="0" marR="0" lvl="0" indent="0" algn="l" defTabSz="914400" rtl="0" eaLnBrk="1" fontAlgn="auto" latinLnBrk="0" hangingPunct="1">
-              <a:lnSpc>
-                <a:spcPct val="100000"/>
-              </a:lnSpc>
-              <a:spcBef>
-                <a:spcPts val="0"/>
-              </a:spcBef>
-              <a:spcAft>
-                <a:spcPts val="0"/>
-              </a:spcAft>
-              <a:buClrTx/>
-              <a:buSzTx/>
-              <a:buFontTx/>
-              <a:buNone/>
-              <a:tabLst/>
-              <a:defRPr/>
-            </a:pPr>
-            <a:r>
-              <a:rPr lang="en-US" dirty="0">
-                <a:solidFill>
-                  <a:srgbClr val="FFFFFF"/>
-                </a:solidFill>
-              </a:rPr>
-              <a:t>(</a:t>
-            </a:r>
-            <a:r>
-              <a:rPr lang="en-US" dirty="0" err="1">
-                <a:solidFill>
-                  <a:srgbClr val="FFFFFF"/>
-                </a:solidFill>
-              </a:rPr>
-              <a:t>powerpoint’s</a:t>
-            </a:r>
-            <a:r>
-              <a:rPr lang="en-US" dirty="0">
-                <a:solidFill>
-                  <a:srgbClr val="FFFFFF"/>
-                </a:solidFill>
-              </a:rPr>
-              <a:t> assistant thinks alligators, um, crocodiles are dragons)</a:t>
-            </a:r>
-          </a:p>
-          <a:p>
             <a:endParaRPr lang="en-US" dirty="0"/>
           </a:p>
         </p:txBody>
@@ -772,7 +702,7 @@
           <a:p>
             <a:fld id="{FAFB6825-279C-2745-85D9-F734AAE5F76F}" type="slidenum">
               <a:rPr lang="en-US" smtClean="0"/>
-              <a:t>21</a:t>
+              <a:t>13</a:t>
             </a:fld>
             <a:endParaRPr lang="en-US"/>
           </a:p>
@@ -859,7 +789,7 @@
           <a:p>
             <a:fld id="{FAFB6825-279C-2745-85D9-F734AAE5F76F}" type="slidenum">
               <a:rPr lang="en-US" smtClean="0"/>
-              <a:t>30</a:t>
+              <a:t>28</a:t>
             </a:fld>
             <a:endParaRPr lang="en-US"/>
           </a:p>
@@ -946,7 +876,7 @@
           <a:p>
             <a:fld id="{FAFB6825-279C-2745-85D9-F734AAE5F76F}" type="slidenum">
               <a:rPr lang="en-US" smtClean="0"/>
-              <a:t>35</a:t>
+              <a:t>33</a:t>
             </a:fld>
             <a:endParaRPr lang="en-US"/>
           </a:p>
@@ -1049,7 +979,7 @@
           <a:p>
             <a:fld id="{FAFB6825-279C-2745-85D9-F734AAE5F76F}" type="slidenum">
               <a:rPr lang="en-US" smtClean="0"/>
-              <a:t>40</a:t>
+              <a:t>38</a:t>
             </a:fld>
             <a:endParaRPr lang="en-US"/>
           </a:p>
@@ -23388,450 +23318,6 @@
 <file path=ppt/slides/slide10.xml><?xml version="1.0" encoding="utf-8"?>
 <p:sld xmlns:a="http://schemas.openxmlformats.org/drawingml/2006/main" xmlns:r="http://schemas.openxmlformats.org/officeDocument/2006/relationships" xmlns:p="http://schemas.openxmlformats.org/presentationml/2006/main">
   <p:cSld>
-    <p:bg>
-      <p:bgPr>
-        <a:solidFill>
-          <a:schemeClr val="bg1"/>
-        </a:solidFill>
-        <a:effectLst/>
-      </p:bgPr>
-    </p:bg>
-    <p:spTree>
-      <p:nvGrpSpPr>
-        <p:cNvPr id="1" name=""/>
-        <p:cNvGrpSpPr/>
-        <p:nvPr/>
-      </p:nvGrpSpPr>
-      <p:grpSpPr>
-        <a:xfrm>
-          <a:off x="0" y="0"/>
-          <a:ext cx="0" cy="0"/>
-          <a:chOff x="0" y="0"/>
-          <a:chExt cx="0" cy="0"/>
-        </a:xfrm>
-      </p:grpSpPr>
-      <p:sp useBgFill="1">
-        <p:nvSpPr>
-          <p:cNvPr id="10" name="Rectangle 9">
-            <a:extLst>
-              <a:ext uri="{FF2B5EF4-FFF2-40B4-BE49-F238E27FC236}">
-                <a16:creationId xmlns:a16="http://schemas.microsoft.com/office/drawing/2014/main" id="{0671A8AE-40A1-4631-A6B8-581AFF065482}"/>
-              </a:ext>
-              <a:ext uri="{C183D7F6-B498-43B3-948B-1728B52AA6E4}">
-                <adec:decorative xmlns:adec="http://schemas.microsoft.com/office/drawing/2017/decorative" val="1"/>
-              </a:ext>
-            </a:extLst>
-          </p:cNvPr>
-          <p:cNvSpPr>
-            <a:spLocks noGrp="1" noRot="1" noChangeAspect="1" noMove="1" noResize="1" noEditPoints="1" noAdjustHandles="1" noChangeArrowheads="1" noChangeShapeType="1" noTextEdit="1"/>
-          </p:cNvSpPr>
-          <p:nvPr>
-            <p:extLst>
-              <p:ext uri="{386F3935-93C4-4BCD-93E2-E3B085C9AB24}">
-                <p16:designElem xmlns:p16="http://schemas.microsoft.com/office/powerpoint/2015/main" val="1"/>
-              </p:ext>
-            </p:extLst>
-          </p:nvPr>
-        </p:nvSpPr>
-        <p:spPr>
-          <a:xfrm>
-            <a:off x="0" y="0"/>
-            <a:ext cx="12192000" cy="6858000"/>
-          </a:xfrm>
-          <a:prstGeom prst="rect">
-            <a:avLst/>
-          </a:prstGeom>
-          <a:ln>
-            <a:noFill/>
-          </a:ln>
-        </p:spPr>
-        <p:style>
-          <a:lnRef idx="2">
-            <a:schemeClr val="accent1">
-              <a:shade val="50000"/>
-            </a:schemeClr>
-          </a:lnRef>
-          <a:fillRef idx="1">
-            <a:schemeClr val="accent1"/>
-          </a:fillRef>
-          <a:effectRef idx="0">
-            <a:schemeClr val="accent1"/>
-          </a:effectRef>
-          <a:fontRef idx="minor">
-            <a:schemeClr val="lt1"/>
-          </a:fontRef>
-        </p:style>
-        <p:txBody>
-          <a:bodyPr rtlCol="0" anchor="ctr"/>
-          <a:lstStyle/>
-          <a:p>
-            <a:pPr algn="ctr"/>
-            <a:endParaRPr lang="en-US"/>
-          </a:p>
-        </p:txBody>
-      </p:sp>
-      <p:pic>
-        <p:nvPicPr>
-          <p:cNvPr id="6" name="Picture 5" descr="A metal dumbell">
-            <a:extLst>
-              <a:ext uri="{FF2B5EF4-FFF2-40B4-BE49-F238E27FC236}">
-                <a16:creationId xmlns:a16="http://schemas.microsoft.com/office/drawing/2014/main" id="{CE55820C-9789-3E42-22C2-441916543004}"/>
-              </a:ext>
-            </a:extLst>
-          </p:cNvPr>
-          <p:cNvPicPr>
-            <a:picLocks noChangeAspect="1"/>
-          </p:cNvPicPr>
-          <p:nvPr/>
-        </p:nvPicPr>
-        <p:blipFill rotWithShape="1">
-          <a:blip r:embed="rId2"/>
-          <a:srcRect t="4795" r="-1" b="14475"/>
-          <a:stretch/>
-        </p:blipFill>
-        <p:spPr>
-          <a:xfrm>
-            <a:off x="3523488" y="10"/>
-            <a:ext cx="8668512" cy="6857990"/>
-          </a:xfrm>
-          <a:prstGeom prst="rect">
-            <a:avLst/>
-          </a:prstGeom>
-        </p:spPr>
-      </p:pic>
-      <p:sp>
-        <p:nvSpPr>
-          <p:cNvPr id="12" name="Rectangle 11">
-            <a:extLst>
-              <a:ext uri="{FF2B5EF4-FFF2-40B4-BE49-F238E27FC236}">
-                <a16:creationId xmlns:a16="http://schemas.microsoft.com/office/drawing/2014/main" id="{AB58EF07-17C2-48CF-ABB0-EEF1F17CB8F0}"/>
-              </a:ext>
-              <a:ext uri="{C183D7F6-B498-43B3-948B-1728B52AA6E4}">
-                <adec:decorative xmlns:adec="http://schemas.microsoft.com/office/drawing/2017/decorative" val="1"/>
-              </a:ext>
-            </a:extLst>
-          </p:cNvPr>
-          <p:cNvSpPr>
-            <a:spLocks noGrp="1" noRot="1" noChangeAspect="1" noMove="1" noResize="1" noEditPoints="1" noAdjustHandles="1" noChangeArrowheads="1" noChangeShapeType="1" noTextEdit="1"/>
-          </p:cNvSpPr>
-          <p:nvPr>
-            <p:extLst>
-              <p:ext uri="{386F3935-93C4-4BCD-93E2-E3B085C9AB24}">
-                <p16:designElem xmlns:p16="http://schemas.microsoft.com/office/powerpoint/2015/main" val="1"/>
-              </p:ext>
-            </p:extLst>
-          </p:nvPr>
-        </p:nvSpPr>
-        <p:spPr>
-          <a:xfrm>
-            <a:off x="3" y="0"/>
-            <a:ext cx="9339206" cy="6858000"/>
-          </a:xfrm>
-          <a:prstGeom prst="rect">
-            <a:avLst/>
-          </a:prstGeom>
-          <a:gradFill>
-            <a:gsLst>
-              <a:gs pos="58000">
-                <a:schemeClr val="tx1"/>
-              </a:gs>
-              <a:gs pos="33000">
-                <a:schemeClr val="tx1">
-                  <a:alpha val="64000"/>
-                </a:schemeClr>
-              </a:gs>
-              <a:gs pos="0">
-                <a:schemeClr val="tx1">
-                  <a:alpha val="0"/>
-                </a:schemeClr>
-              </a:gs>
-              <a:gs pos="100000">
-                <a:schemeClr val="tx1"/>
-              </a:gs>
-            </a:gsLst>
-            <a:lin ang="10800000" scaled="0"/>
-          </a:gradFill>
-          <a:ln>
-            <a:noFill/>
-          </a:ln>
-        </p:spPr>
-        <p:style>
-          <a:lnRef idx="2">
-            <a:schemeClr val="accent1">
-              <a:shade val="50000"/>
-            </a:schemeClr>
-          </a:lnRef>
-          <a:fillRef idx="1">
-            <a:schemeClr val="accent1"/>
-          </a:fillRef>
-          <a:effectRef idx="0">
-            <a:schemeClr val="accent1"/>
-          </a:effectRef>
-          <a:fontRef idx="minor">
-            <a:schemeClr val="lt1"/>
-          </a:fontRef>
-        </p:style>
-        <p:txBody>
-          <a:bodyPr rtlCol="0" anchor="ctr"/>
-          <a:lstStyle/>
-          <a:p>
-            <a:pPr algn="ctr"/>
-            <a:endParaRPr lang="en-US" dirty="0"/>
-          </a:p>
-        </p:txBody>
-      </p:sp>
-      <p:sp>
-        <p:nvSpPr>
-          <p:cNvPr id="2" name="Title 1">
-            <a:extLst>
-              <a:ext uri="{FF2B5EF4-FFF2-40B4-BE49-F238E27FC236}">
-                <a16:creationId xmlns:a16="http://schemas.microsoft.com/office/drawing/2014/main" id="{5987BC5B-9780-B307-6C28-2C3A80ECD586}"/>
-              </a:ext>
-            </a:extLst>
-          </p:cNvPr>
-          <p:cNvSpPr>
-            <a:spLocks noGrp="1"/>
-          </p:cNvSpPr>
-          <p:nvPr>
-            <p:ph type="title"/>
-          </p:nvPr>
-        </p:nvSpPr>
-        <p:spPr>
-          <a:xfrm>
-            <a:off x="477981" y="1122363"/>
-            <a:ext cx="4023360" cy="3204134"/>
-          </a:xfrm>
-        </p:spPr>
-        <p:txBody>
-          <a:bodyPr vert="horz" lIns="91440" tIns="45720" rIns="91440" bIns="45720" rtlCol="0" anchor="b">
-            <a:normAutofit/>
-          </a:bodyPr>
-          <a:lstStyle/>
-          <a:p>
-            <a:r>
-              <a:rPr lang="en-US" sz="4800" dirty="0">
-                <a:solidFill>
-                  <a:schemeClr val="bg1"/>
-                </a:solidFill>
-              </a:rPr>
-              <a:t>Mechanics of action</a:t>
-            </a:r>
-          </a:p>
-        </p:txBody>
-      </p:sp>
-      <p:sp>
-        <p:nvSpPr>
-          <p:cNvPr id="4" name="Text Placeholder 3">
-            <a:extLst>
-              <a:ext uri="{FF2B5EF4-FFF2-40B4-BE49-F238E27FC236}">
-                <a16:creationId xmlns:a16="http://schemas.microsoft.com/office/drawing/2014/main" id="{C63949E0-E563-9E8A-6047-81DF544B1EBF}"/>
-              </a:ext>
-            </a:extLst>
-          </p:cNvPr>
-          <p:cNvSpPr>
-            <a:spLocks noGrp="1"/>
-          </p:cNvSpPr>
-          <p:nvPr>
-            <p:ph type="body" idx="1"/>
-          </p:nvPr>
-        </p:nvSpPr>
-        <p:spPr>
-          <a:xfrm>
-            <a:off x="477980" y="4872922"/>
-            <a:ext cx="4023359" cy="1208141"/>
-          </a:xfrm>
-        </p:spPr>
-        <p:txBody>
-          <a:bodyPr vert="horz" lIns="91440" tIns="45720" rIns="91440" bIns="45720" rtlCol="0">
-            <a:normAutofit/>
-          </a:bodyPr>
-          <a:lstStyle/>
-          <a:p>
-            <a:endParaRPr lang="en-US" sz="2000">
-              <a:solidFill>
-                <a:schemeClr val="bg1"/>
-              </a:solidFill>
-            </a:endParaRPr>
-          </a:p>
-        </p:txBody>
-      </p:sp>
-      <p:sp>
-        <p:nvSpPr>
-          <p:cNvPr id="14" name="Rectangle 13">
-            <a:extLst>
-              <a:ext uri="{FF2B5EF4-FFF2-40B4-BE49-F238E27FC236}">
-                <a16:creationId xmlns:a16="http://schemas.microsoft.com/office/drawing/2014/main" id="{AF2F604E-43BE-4DC3-B983-E071523364F8}"/>
-              </a:ext>
-              <a:ext uri="{C183D7F6-B498-43B3-948B-1728B52AA6E4}">
-                <adec:decorative xmlns:adec="http://schemas.microsoft.com/office/drawing/2017/decorative" val="1"/>
-              </a:ext>
-            </a:extLst>
-          </p:cNvPr>
-          <p:cNvSpPr>
-            <a:spLocks noGrp="1" noRot="1" noChangeAspect="1" noMove="1" noResize="1" noEditPoints="1" noAdjustHandles="1" noChangeArrowheads="1" noChangeShapeType="1" noTextEdit="1"/>
-          </p:cNvSpPr>
-          <p:nvPr>
-            <p:extLst>
-              <p:ext uri="{386F3935-93C4-4BCD-93E2-E3B085C9AB24}">
-                <p16:designElem xmlns:p16="http://schemas.microsoft.com/office/powerpoint/2015/main" val="1"/>
-              </p:ext>
-            </p:extLst>
-          </p:nvPr>
-        </p:nvSpPr>
-        <p:spPr>
-          <a:xfrm rot="5400000">
-            <a:off x="759921" y="346791"/>
-            <a:ext cx="146304" cy="704088"/>
-          </a:xfrm>
-          <a:prstGeom prst="rect">
-            <a:avLst/>
-          </a:prstGeom>
-          <a:solidFill>
-            <a:schemeClr val="accent2"/>
-          </a:solidFill>
-          <a:ln>
-            <a:noFill/>
-          </a:ln>
-        </p:spPr>
-        <p:style>
-          <a:lnRef idx="2">
-            <a:schemeClr val="accent1">
-              <a:shade val="50000"/>
-            </a:schemeClr>
-          </a:lnRef>
-          <a:fillRef idx="1">
-            <a:schemeClr val="accent1"/>
-          </a:fillRef>
-          <a:effectRef idx="0">
-            <a:schemeClr val="accent1"/>
-          </a:effectRef>
-          <a:fontRef idx="minor">
-            <a:schemeClr val="lt1"/>
-          </a:fontRef>
-        </p:style>
-        <p:txBody>
-          <a:bodyPr rtlCol="0" anchor="ctr"/>
-          <a:lstStyle/>
-          <a:p>
-            <a:pPr algn="ctr"/>
-            <a:endParaRPr lang="en-US">
-              <a:solidFill>
-                <a:prstClr val="white"/>
-              </a:solidFill>
-              <a:latin typeface="Calibri" panose="020F0502020204030204"/>
-            </a:endParaRPr>
-          </a:p>
-        </p:txBody>
-      </p:sp>
-      <p:sp>
-        <p:nvSpPr>
-          <p:cNvPr id="16" name="Rectangle 15">
-            <a:extLst>
-              <a:ext uri="{FF2B5EF4-FFF2-40B4-BE49-F238E27FC236}">
-                <a16:creationId xmlns:a16="http://schemas.microsoft.com/office/drawing/2014/main" id="{08C9B587-E65E-4B52-B37C-ABEBB6E87928}"/>
-              </a:ext>
-              <a:ext uri="{C183D7F6-B498-43B3-948B-1728B52AA6E4}">
-                <adec:decorative xmlns:adec="http://schemas.microsoft.com/office/drawing/2017/decorative" val="1"/>
-              </a:ext>
-            </a:extLst>
-          </p:cNvPr>
-          <p:cNvSpPr>
-            <a:spLocks noGrp="1" noRot="1" noChangeAspect="1" noMove="1" noResize="1" noEditPoints="1" noAdjustHandles="1" noChangeArrowheads="1" noChangeShapeType="1" noTextEdit="1"/>
-          </p:cNvSpPr>
-          <p:nvPr>
-            <p:extLst>
-              <p:ext uri="{386F3935-93C4-4BCD-93E2-E3B085C9AB24}">
-                <p16:designElem xmlns:p16="http://schemas.microsoft.com/office/powerpoint/2015/main" val="1"/>
-              </p:ext>
-            </p:extLst>
-          </p:nvPr>
-        </p:nvSpPr>
-        <p:spPr>
-          <a:xfrm>
-            <a:off x="481029" y="4546920"/>
-            <a:ext cx="3977640" cy="18288"/>
-          </a:xfrm>
-          <a:prstGeom prst="rect">
-            <a:avLst/>
-          </a:prstGeom>
-          <a:solidFill>
-            <a:schemeClr val="tx1"/>
-          </a:solidFill>
-          <a:ln w="3175">
-            <a:noFill/>
-          </a:ln>
-          <a:effectLst/>
-        </p:spPr>
-        <p:style>
-          <a:lnRef idx="2">
-            <a:schemeClr val="accent1">
-              <a:shade val="50000"/>
-            </a:schemeClr>
-          </a:lnRef>
-          <a:fillRef idx="1">
-            <a:schemeClr val="accent1"/>
-          </a:fillRef>
-          <a:effectRef idx="0">
-            <a:schemeClr val="accent1"/>
-          </a:effectRef>
-          <a:fontRef idx="minor">
-            <a:schemeClr val="lt1"/>
-          </a:fontRef>
-        </p:style>
-        <p:txBody>
-          <a:bodyPr rtlCol="0" anchor="ctr"/>
-          <a:lstStyle/>
-          <a:p>
-            <a:pPr marL="0" marR="0" lvl="0" indent="0" algn="ctr" defTabSz="914400" rtl="0" eaLnBrk="1" fontAlgn="auto" latinLnBrk="0" hangingPunct="1">
-              <a:lnSpc>
-                <a:spcPct val="100000"/>
-              </a:lnSpc>
-              <a:spcBef>
-                <a:spcPts val="0"/>
-              </a:spcBef>
-              <a:spcAft>
-                <a:spcPts val="0"/>
-              </a:spcAft>
-              <a:buClrTx/>
-              <a:buSzTx/>
-              <a:buFontTx/>
-              <a:buNone/>
-              <a:tabLst/>
-              <a:defRPr/>
-            </a:pPr>
-            <a:endParaRPr kumimoji="0" lang="en-US" sz="1800" b="0" i="0" u="none" strike="noStrike" kern="1200" cap="none" spc="0" normalizeH="0" baseline="0" noProof="0">
-              <a:ln>
-                <a:noFill/>
-              </a:ln>
-              <a:solidFill>
-                <a:prstClr val="white"/>
-              </a:solidFill>
-              <a:effectLst/>
-              <a:uLnTx/>
-              <a:uFillTx/>
-              <a:latin typeface="Calibri" panose="020F0502020204030204"/>
-              <a:ea typeface="+mn-ea"/>
-              <a:cs typeface="+mn-cs"/>
-            </a:endParaRPr>
-          </a:p>
-        </p:txBody>
-      </p:sp>
-    </p:spTree>
-    <p:extLst>
-      <p:ext uri="{BB962C8B-B14F-4D97-AF65-F5344CB8AC3E}">
-        <p14:creationId xmlns:p14="http://schemas.microsoft.com/office/powerpoint/2010/main" val="365864321"/>
-      </p:ext>
-    </p:extLst>
-  </p:cSld>
-  <p:clrMapOvr>
-    <a:masterClrMapping/>
-  </p:clrMapOvr>
-</p:sld>
-</file>
-
-<file path=ppt/slides/slide11.xml><?xml version="1.0" encoding="utf-8"?>
-<p:sld xmlns:a="http://schemas.openxmlformats.org/drawingml/2006/main" xmlns:r="http://schemas.openxmlformats.org/officeDocument/2006/relationships" xmlns:p="http://schemas.openxmlformats.org/presentationml/2006/main">
-  <p:cSld>
     <p:spTree>
       <p:nvGrpSpPr>
         <p:cNvPr id="1" name=""/>
@@ -23923,7 +23409,7 @@
 </p:sld>
 </file>
 
-<file path=ppt/slides/slide12.xml><?xml version="1.0" encoding="utf-8"?>
+<file path=ppt/slides/slide11.xml><?xml version="1.0" encoding="utf-8"?>
 <p:sld xmlns:a="http://schemas.openxmlformats.org/drawingml/2006/main" xmlns:r="http://schemas.openxmlformats.org/officeDocument/2006/relationships" xmlns:p="http://schemas.openxmlformats.org/presentationml/2006/main">
   <p:cSld>
     <p:spTree>
@@ -24069,7 +23555,7 @@
 </p:sld>
 </file>
 
-<file path=ppt/slides/slide13.xml><?xml version="1.0" encoding="utf-8"?>
+<file path=ppt/slides/slide12.xml><?xml version="1.0" encoding="utf-8"?>
 <p:sld xmlns:a="http://schemas.openxmlformats.org/drawingml/2006/main" xmlns:r="http://schemas.openxmlformats.org/officeDocument/2006/relationships" xmlns:p="http://schemas.openxmlformats.org/presentationml/2006/main">
   <p:cSld>
     <p:spTree>
@@ -24209,7 +23695,695 @@
 </p:sld>
 </file>
 
+<file path=ppt/slides/slide13.xml><?xml version="1.0" encoding="utf-8"?>
+<p:sld xmlns:a="http://schemas.openxmlformats.org/drawingml/2006/main" xmlns:r="http://schemas.openxmlformats.org/officeDocument/2006/relationships" xmlns:p="http://schemas.openxmlformats.org/presentationml/2006/main">
+  <p:cSld>
+    <p:bg>
+      <p:bgPr>
+        <a:solidFill>
+          <a:srgbClr val="000000"/>
+        </a:solidFill>
+        <a:effectLst/>
+      </p:bgPr>
+    </p:bg>
+    <p:spTree>
+      <p:nvGrpSpPr>
+        <p:cNvPr id="1" name=""/>
+        <p:cNvGrpSpPr/>
+        <p:nvPr/>
+      </p:nvGrpSpPr>
+      <p:grpSpPr>
+        <a:xfrm>
+          <a:off x="0" y="0"/>
+          <a:ext cx="0" cy="0"/>
+          <a:chOff x="0" y="0"/>
+          <a:chExt cx="0" cy="0"/>
+        </a:xfrm>
+      </p:grpSpPr>
+      <p:pic>
+        <p:nvPicPr>
+          <p:cNvPr id="20" name="Picture 19" descr="Alligators in shallow water">
+            <a:extLst>
+              <a:ext uri="{FF2B5EF4-FFF2-40B4-BE49-F238E27FC236}">
+                <a16:creationId xmlns:a16="http://schemas.microsoft.com/office/drawing/2014/main" id="{4D674205-DFE9-F178-2ED3-774B622E4AC7}"/>
+              </a:ext>
+            </a:extLst>
+          </p:cNvPr>
+          <p:cNvPicPr>
+            <a:picLocks noChangeAspect="1"/>
+          </p:cNvPicPr>
+          <p:nvPr/>
+        </p:nvPicPr>
+        <p:blipFill rotWithShape="1">
+          <a:blip r:embed="rId3">
+            <a:alphaModFix amt="50000"/>
+          </a:blip>
+          <a:srcRect t="12165" b="3565"/>
+          <a:stretch/>
+        </p:blipFill>
+        <p:spPr>
+          <a:xfrm>
+            <a:off x="20" y="1"/>
+            <a:ext cx="12191980" cy="6857999"/>
+          </a:xfrm>
+          <a:prstGeom prst="rect">
+            <a:avLst/>
+          </a:prstGeom>
+        </p:spPr>
+      </p:pic>
+      <p:sp>
+        <p:nvSpPr>
+          <p:cNvPr id="4" name="Title 3">
+            <a:extLst>
+              <a:ext uri="{FF2B5EF4-FFF2-40B4-BE49-F238E27FC236}">
+                <a16:creationId xmlns:a16="http://schemas.microsoft.com/office/drawing/2014/main" id="{C9D914CA-03E1-68DA-097E-FDDC73518655}"/>
+              </a:ext>
+            </a:extLst>
+          </p:cNvPr>
+          <p:cNvSpPr>
+            <a:spLocks noGrp="1"/>
+          </p:cNvSpPr>
+          <p:nvPr>
+            <p:ph type="title"/>
+          </p:nvPr>
+        </p:nvSpPr>
+        <p:spPr/>
+        <p:txBody>
+          <a:bodyPr vert="horz" lIns="91440" tIns="45720" rIns="91440" bIns="45720" rtlCol="0" anchor="b">
+            <a:normAutofit/>
+          </a:bodyPr>
+          <a:lstStyle/>
+          <a:p>
+            <a:pPr algn="ctr"/>
+            <a:r>
+              <a:rPr lang="en-US">
+                <a:solidFill>
+                  <a:srgbClr val="FFFFFF"/>
+                </a:solidFill>
+              </a:rPr>
+              <a:t>Amendments</a:t>
+            </a:r>
+          </a:p>
+        </p:txBody>
+      </p:sp>
+      <p:sp>
+        <p:nvSpPr>
+          <p:cNvPr id="5" name="Text Placeholder 4">
+            <a:extLst>
+              <a:ext uri="{FF2B5EF4-FFF2-40B4-BE49-F238E27FC236}">
+                <a16:creationId xmlns:a16="http://schemas.microsoft.com/office/drawing/2014/main" id="{3ABB89B0-23F7-0639-7027-71AE8ED52188}"/>
+              </a:ext>
+            </a:extLst>
+          </p:cNvPr>
+          <p:cNvSpPr>
+            <a:spLocks noGrp="1"/>
+          </p:cNvSpPr>
+          <p:nvPr>
+            <p:ph type="body" idx="1"/>
+          </p:nvPr>
+        </p:nvSpPr>
+        <p:spPr/>
+        <p:txBody>
+          <a:bodyPr vert="horz" lIns="91440" tIns="45720" rIns="91440" bIns="45720" rtlCol="0">
+            <a:normAutofit/>
+          </a:bodyPr>
+          <a:lstStyle/>
+          <a:p>
+            <a:pPr algn="ctr"/>
+            <a:r>
+              <a:rPr lang="en-US" dirty="0">
+                <a:solidFill>
+                  <a:srgbClr val="FFFFFF"/>
+                </a:solidFill>
+              </a:rPr>
+              <a:t>Here be dragons</a:t>
+            </a:r>
+          </a:p>
+        </p:txBody>
+      </p:sp>
+    </p:spTree>
+    <p:extLst>
+      <p:ext uri="{BB962C8B-B14F-4D97-AF65-F5344CB8AC3E}">
+        <p14:creationId xmlns:p14="http://schemas.microsoft.com/office/powerpoint/2010/main" val="1504253236"/>
+      </p:ext>
+    </p:extLst>
+  </p:cSld>
+  <p:clrMapOvr>
+    <a:overrideClrMapping bg1="dk1" tx1="lt1" bg2="dk2" tx2="lt2" accent1="accent1" accent2="accent2" accent3="accent3" accent4="accent4" accent5="accent5" accent6="accent6" hlink="hlink" folHlink="folHlink"/>
+  </p:clrMapOvr>
+</p:sld>
+</file>
+
 <file path=ppt/slides/slide14.xml><?xml version="1.0" encoding="utf-8"?>
+<p:sld xmlns:a="http://schemas.openxmlformats.org/drawingml/2006/main" xmlns:r="http://schemas.openxmlformats.org/officeDocument/2006/relationships" xmlns:p="http://schemas.openxmlformats.org/presentationml/2006/main">
+  <p:cSld>
+    <p:spTree>
+      <p:nvGrpSpPr>
+        <p:cNvPr id="1" name=""/>
+        <p:cNvGrpSpPr/>
+        <p:nvPr/>
+      </p:nvGrpSpPr>
+      <p:grpSpPr>
+        <a:xfrm>
+          <a:off x="0" y="0"/>
+          <a:ext cx="0" cy="0"/>
+          <a:chOff x="0" y="0"/>
+          <a:chExt cx="0" cy="0"/>
+        </a:xfrm>
+      </p:grpSpPr>
+      <p:sp>
+        <p:nvSpPr>
+          <p:cNvPr id="4" name="Title 3">
+            <a:extLst>
+              <a:ext uri="{FF2B5EF4-FFF2-40B4-BE49-F238E27FC236}">
+                <a16:creationId xmlns:a16="http://schemas.microsoft.com/office/drawing/2014/main" id="{4C010BC8-8145-9047-193C-C512503F16B5}"/>
+              </a:ext>
+            </a:extLst>
+          </p:cNvPr>
+          <p:cNvSpPr>
+            <a:spLocks noGrp="1"/>
+          </p:cNvSpPr>
+          <p:nvPr>
+            <p:ph type="title"/>
+          </p:nvPr>
+        </p:nvSpPr>
+        <p:spPr/>
+        <p:txBody>
+          <a:bodyPr/>
+          <a:lstStyle/>
+          <a:p>
+            <a:r>
+              <a:rPr lang="en-US" dirty="0"/>
+              <a:t>Basic rules for amendments</a:t>
+            </a:r>
+          </a:p>
+        </p:txBody>
+      </p:sp>
+      <p:sp>
+        <p:nvSpPr>
+          <p:cNvPr id="5" name="Content Placeholder 4">
+            <a:extLst>
+              <a:ext uri="{FF2B5EF4-FFF2-40B4-BE49-F238E27FC236}">
+                <a16:creationId xmlns:a16="http://schemas.microsoft.com/office/drawing/2014/main" id="{F4E05510-DD9A-949C-6B6F-893F26A96B9E}"/>
+              </a:ext>
+            </a:extLst>
+          </p:cNvPr>
+          <p:cNvSpPr>
+            <a:spLocks noGrp="1"/>
+          </p:cNvSpPr>
+          <p:nvPr>
+            <p:ph idx="1"/>
+          </p:nvPr>
+        </p:nvSpPr>
+        <p:spPr/>
+        <p:txBody>
+          <a:bodyPr/>
+          <a:lstStyle/>
+          <a:p>
+            <a:r>
+              <a:rPr lang="en-US" dirty="0"/>
+              <a:t>NO DOUBLE CONSIDERATION</a:t>
+            </a:r>
+          </a:p>
+          <a:p>
+            <a:pPr lvl="1"/>
+            <a:r>
+              <a:rPr lang="en-US" dirty="0"/>
+              <a:t>Once something is decided, it can’t be taken up again (without an intervening motion to reconsider, et cetera)</a:t>
+            </a:r>
+          </a:p>
+          <a:p>
+            <a:pPr lvl="1"/>
+            <a:r>
+              <a:rPr lang="en-US" dirty="0"/>
+              <a:t>What this actually means is incredibly difficult in practice</a:t>
+            </a:r>
+          </a:p>
+          <a:p>
+            <a:pPr lvl="2"/>
+            <a:r>
+              <a:rPr lang="en-US" dirty="0"/>
+              <a:t>I’m looking at you, ASCSU</a:t>
+            </a:r>
+          </a:p>
+          <a:p>
+            <a:pPr lvl="2"/>
+            <a:endParaRPr lang="en-US" dirty="0"/>
+          </a:p>
+          <a:p>
+            <a:r>
+              <a:rPr lang="en-US" dirty="0"/>
+              <a:t>GERMANENESS: Amendments must be germane</a:t>
+            </a:r>
+          </a:p>
+          <a:p>
+            <a:pPr lvl="1"/>
+            <a:r>
+              <a:rPr lang="en-US" dirty="0"/>
+              <a:t>Simple: On the same subject</a:t>
+            </a:r>
+          </a:p>
+          <a:p>
+            <a:pPr lvl="1"/>
+            <a:r>
+              <a:rPr lang="en-US" dirty="0"/>
+              <a:t>Striking ‘praise’ and replacing it with ‘condemn’ is germane because the issue is the attitude expressed.</a:t>
+            </a:r>
+          </a:p>
+          <a:p>
+            <a:pPr lvl="1"/>
+            <a:r>
+              <a:rPr lang="en-US" dirty="0"/>
+              <a:t>Details: ARRRRRRRRGGGGGHHHH</a:t>
+            </a:r>
+          </a:p>
+          <a:p>
+            <a:endParaRPr lang="en-US" dirty="0"/>
+          </a:p>
+        </p:txBody>
+      </p:sp>
+    </p:spTree>
+    <p:extLst>
+      <p:ext uri="{BB962C8B-B14F-4D97-AF65-F5344CB8AC3E}">
+        <p14:creationId xmlns:p14="http://schemas.microsoft.com/office/powerpoint/2010/main" val="2995829816"/>
+      </p:ext>
+    </p:extLst>
+  </p:cSld>
+  <p:clrMapOvr>
+    <a:masterClrMapping/>
+  </p:clrMapOvr>
+</p:sld>
+</file>
+
+<file path=ppt/slides/slide15.xml><?xml version="1.0" encoding="utf-8"?>
+<p:sld xmlns:a="http://schemas.openxmlformats.org/drawingml/2006/main" xmlns:r="http://schemas.openxmlformats.org/officeDocument/2006/relationships" xmlns:p="http://schemas.openxmlformats.org/presentationml/2006/main">
+  <p:cSld>
+    <p:spTree>
+      <p:nvGrpSpPr>
+        <p:cNvPr id="1" name=""/>
+        <p:cNvGrpSpPr/>
+        <p:nvPr/>
+      </p:nvGrpSpPr>
+      <p:grpSpPr>
+        <a:xfrm>
+          <a:off x="0" y="0"/>
+          <a:ext cx="0" cy="0"/>
+          <a:chOff x="0" y="0"/>
+          <a:chExt cx="0" cy="0"/>
+        </a:xfrm>
+      </p:grpSpPr>
+      <p:sp>
+        <p:nvSpPr>
+          <p:cNvPr id="2" name="Title 1">
+            <a:extLst>
+              <a:ext uri="{FF2B5EF4-FFF2-40B4-BE49-F238E27FC236}">
+                <a16:creationId xmlns:a16="http://schemas.microsoft.com/office/drawing/2014/main" id="{AC05B117-5ED8-7CCC-672A-2193F398D138}"/>
+              </a:ext>
+            </a:extLst>
+          </p:cNvPr>
+          <p:cNvSpPr>
+            <a:spLocks noGrp="1"/>
+          </p:cNvSpPr>
+          <p:nvPr>
+            <p:ph type="title"/>
+          </p:nvPr>
+        </p:nvSpPr>
+        <p:spPr/>
+        <p:txBody>
+          <a:bodyPr/>
+          <a:lstStyle/>
+          <a:p>
+            <a:r>
+              <a:rPr lang="en-US" dirty="0"/>
+              <a:t>Who can amend?</a:t>
+            </a:r>
+          </a:p>
+        </p:txBody>
+      </p:sp>
+      <p:sp>
+        <p:nvSpPr>
+          <p:cNvPr id="3" name="Content Placeholder 2">
+            <a:extLst>
+              <a:ext uri="{FF2B5EF4-FFF2-40B4-BE49-F238E27FC236}">
+                <a16:creationId xmlns:a16="http://schemas.microsoft.com/office/drawing/2014/main" id="{648ADC4C-9975-BF7F-2743-69729759C6E6}"/>
+              </a:ext>
+            </a:extLst>
+          </p:cNvPr>
+          <p:cNvSpPr>
+            <a:spLocks noGrp="1"/>
+          </p:cNvSpPr>
+          <p:nvPr>
+            <p:ph idx="1"/>
+          </p:nvPr>
+        </p:nvSpPr>
+        <p:spPr/>
+        <p:txBody>
+          <a:bodyPr/>
+          <a:lstStyle/>
+          <a:p>
+            <a:r>
+              <a:rPr lang="en-US" dirty="0"/>
+              <a:t>It is sometimes thought that:</a:t>
+            </a:r>
+          </a:p>
+          <a:p>
+            <a:pPr lvl="1"/>
+            <a:r>
+              <a:rPr lang="en-US" dirty="0">
+                <a:effectLst/>
+              </a:rPr>
+              <a:t>[x] You can’t offer an amendment to a motion that you intend to oppose. </a:t>
+            </a:r>
+          </a:p>
+          <a:p>
+            <a:endParaRPr lang="en-US" dirty="0"/>
+          </a:p>
+          <a:p>
+            <a:r>
+              <a:rPr lang="en-US" dirty="0"/>
+              <a:t>EQUALITY shows this is wrong: Opponents have a right to try to make whatever passes as palatable to them as possible. </a:t>
+            </a:r>
+          </a:p>
+        </p:txBody>
+      </p:sp>
+    </p:spTree>
+    <p:extLst>
+      <p:ext uri="{BB962C8B-B14F-4D97-AF65-F5344CB8AC3E}">
+        <p14:creationId xmlns:p14="http://schemas.microsoft.com/office/powerpoint/2010/main" val="3673029960"/>
+      </p:ext>
+    </p:extLst>
+  </p:cSld>
+  <p:clrMapOvr>
+    <a:masterClrMapping/>
+  </p:clrMapOvr>
+</p:sld>
+</file>
+
+<file path=ppt/slides/slide16.xml><?xml version="1.0" encoding="utf-8"?>
+<p:sld xmlns:a="http://schemas.openxmlformats.org/drawingml/2006/main" xmlns:r="http://schemas.openxmlformats.org/officeDocument/2006/relationships" xmlns:p="http://schemas.openxmlformats.org/presentationml/2006/main">
+  <p:cSld>
+    <p:spTree>
+      <p:nvGrpSpPr>
+        <p:cNvPr id="1" name=""/>
+        <p:cNvGrpSpPr/>
+        <p:nvPr/>
+      </p:nvGrpSpPr>
+      <p:grpSpPr>
+        <a:xfrm>
+          <a:off x="0" y="0"/>
+          <a:ext cx="0" cy="0"/>
+          <a:chOff x="0" y="0"/>
+          <a:chExt cx="0" cy="0"/>
+        </a:xfrm>
+      </p:grpSpPr>
+      <p:sp>
+        <p:nvSpPr>
+          <p:cNvPr id="6" name="Title 5">
+            <a:extLst>
+              <a:ext uri="{FF2B5EF4-FFF2-40B4-BE49-F238E27FC236}">
+                <a16:creationId xmlns:a16="http://schemas.microsoft.com/office/drawing/2014/main" id="{84FB680E-BFDB-5409-17DC-585450ADBF4F}"/>
+              </a:ext>
+            </a:extLst>
+          </p:cNvPr>
+          <p:cNvSpPr>
+            <a:spLocks noGrp="1"/>
+          </p:cNvSpPr>
+          <p:nvPr>
+            <p:ph type="title"/>
+          </p:nvPr>
+        </p:nvSpPr>
+        <p:spPr/>
+        <p:txBody>
+          <a:bodyPr/>
+          <a:lstStyle/>
+          <a:p>
+            <a:r>
+              <a:rPr lang="en-US" dirty="0"/>
+              <a:t>Amending amendments</a:t>
+            </a:r>
+          </a:p>
+        </p:txBody>
+      </p:sp>
+      <p:sp>
+        <p:nvSpPr>
+          <p:cNvPr id="7" name="Content Placeholder 6">
+            <a:extLst>
+              <a:ext uri="{FF2B5EF4-FFF2-40B4-BE49-F238E27FC236}">
+                <a16:creationId xmlns:a16="http://schemas.microsoft.com/office/drawing/2014/main" id="{09BEF616-358E-1D24-BCF0-C670EB10E5CC}"/>
+              </a:ext>
+            </a:extLst>
+          </p:cNvPr>
+          <p:cNvSpPr>
+            <a:spLocks noGrp="1"/>
+          </p:cNvSpPr>
+          <p:nvPr>
+            <p:ph idx="1"/>
+          </p:nvPr>
+        </p:nvSpPr>
+        <p:spPr/>
+        <p:txBody>
+          <a:bodyPr/>
+          <a:lstStyle/>
+          <a:p>
+            <a:r>
+              <a:rPr lang="en-US" dirty="0"/>
+              <a:t>Yes. You can amend any amendment. </a:t>
+            </a:r>
+          </a:p>
+          <a:p>
+            <a:r>
+              <a:rPr lang="en-US" dirty="0"/>
+              <a:t>The madness stops there. You cannot amend an amendment to an amendment. </a:t>
+            </a:r>
+          </a:p>
+          <a:p>
+            <a:pPr lvl="1"/>
+            <a:r>
+              <a:rPr lang="en-US" dirty="0"/>
+              <a:t>Vote down the second order amendment (or both the first and second order amendment) and propose a new one.</a:t>
+            </a:r>
+          </a:p>
+        </p:txBody>
+      </p:sp>
+    </p:spTree>
+    <p:extLst>
+      <p:ext uri="{BB962C8B-B14F-4D97-AF65-F5344CB8AC3E}">
+        <p14:creationId xmlns:p14="http://schemas.microsoft.com/office/powerpoint/2010/main" val="1119591584"/>
+      </p:ext>
+    </p:extLst>
+  </p:cSld>
+  <p:clrMapOvr>
+    <a:masterClrMapping/>
+  </p:clrMapOvr>
+</p:sld>
+</file>
+
+<file path=ppt/slides/slide17.xml><?xml version="1.0" encoding="utf-8"?>
+<p:sld xmlns:a="http://schemas.openxmlformats.org/drawingml/2006/main" xmlns:r="http://schemas.openxmlformats.org/officeDocument/2006/relationships" xmlns:p="http://schemas.openxmlformats.org/presentationml/2006/main">
+  <p:cSld>
+    <p:spTree>
+      <p:nvGrpSpPr>
+        <p:cNvPr id="1" name=""/>
+        <p:cNvGrpSpPr/>
+        <p:nvPr/>
+      </p:nvGrpSpPr>
+      <p:grpSpPr>
+        <a:xfrm>
+          <a:off x="0" y="0"/>
+          <a:ext cx="0" cy="0"/>
+          <a:chOff x="0" y="0"/>
+          <a:chExt cx="0" cy="0"/>
+        </a:xfrm>
+      </p:grpSpPr>
+      <p:sp>
+        <p:nvSpPr>
+          <p:cNvPr id="2" name="Title 1">
+            <a:extLst>
+              <a:ext uri="{FF2B5EF4-FFF2-40B4-BE49-F238E27FC236}">
+                <a16:creationId xmlns:a16="http://schemas.microsoft.com/office/drawing/2014/main" id="{BB4E971B-9B3D-88AF-8747-FF126E687DD9}"/>
+              </a:ext>
+            </a:extLst>
+          </p:cNvPr>
+          <p:cNvSpPr>
+            <a:spLocks noGrp="1"/>
+          </p:cNvSpPr>
+          <p:nvPr>
+            <p:ph type="title"/>
+          </p:nvPr>
+        </p:nvSpPr>
+        <p:spPr/>
+        <p:txBody>
+          <a:bodyPr/>
+          <a:lstStyle/>
+          <a:p>
+            <a:r>
+              <a:rPr lang="en-US" dirty="0"/>
+              <a:t>Best practices to stay out of trouble</a:t>
+            </a:r>
+          </a:p>
+        </p:txBody>
+      </p:sp>
+      <p:sp>
+        <p:nvSpPr>
+          <p:cNvPr id="3" name="Content Placeholder 2">
+            <a:extLst>
+              <a:ext uri="{FF2B5EF4-FFF2-40B4-BE49-F238E27FC236}">
+                <a16:creationId xmlns:a16="http://schemas.microsoft.com/office/drawing/2014/main" id="{4F054232-6CAF-B45D-B878-A546E922DDCD}"/>
+              </a:ext>
+            </a:extLst>
+          </p:cNvPr>
+          <p:cNvSpPr>
+            <a:spLocks noGrp="1"/>
+          </p:cNvSpPr>
+          <p:nvPr>
+            <p:ph idx="1"/>
+          </p:nvPr>
+        </p:nvSpPr>
+        <p:spPr/>
+        <p:txBody>
+          <a:bodyPr/>
+          <a:lstStyle/>
+          <a:p>
+            <a:r>
+              <a:rPr lang="en-US" dirty="0"/>
+              <a:t>Keep amendments simple. Each amendment should deal with as compact a matter as possible</a:t>
+            </a:r>
+          </a:p>
+          <a:p>
+            <a:r>
+              <a:rPr lang="en-US" dirty="0"/>
+              <a:t>Avoid amending across paragraphs/RESOLVED clauses. </a:t>
+            </a:r>
+          </a:p>
+          <a:p>
+            <a:r>
+              <a:rPr lang="en-US" dirty="0"/>
+              <a:t>A series of amendments should always be broken up unless dealing with them separately is going to require multiple votes on the same thing (e.g., every time it says ‘cat’ replace with ‘dog’)</a:t>
+            </a:r>
+          </a:p>
+          <a:p>
+            <a:endParaRPr lang="en-US" dirty="0"/>
+          </a:p>
+        </p:txBody>
+      </p:sp>
+    </p:spTree>
+    <p:extLst>
+      <p:ext uri="{BB962C8B-B14F-4D97-AF65-F5344CB8AC3E}">
+        <p14:creationId xmlns:p14="http://schemas.microsoft.com/office/powerpoint/2010/main" val="3443396952"/>
+      </p:ext>
+    </p:extLst>
+  </p:cSld>
+  <p:clrMapOvr>
+    <a:masterClrMapping/>
+  </p:clrMapOvr>
+</p:sld>
+</file>
+
+<file path=ppt/slides/slide18.xml><?xml version="1.0" encoding="utf-8"?>
+<p:sld xmlns:a="http://schemas.openxmlformats.org/drawingml/2006/main" xmlns:r="http://schemas.openxmlformats.org/officeDocument/2006/relationships" xmlns:p="http://schemas.openxmlformats.org/presentationml/2006/main">
+  <p:cSld>
+    <p:spTree>
+      <p:nvGrpSpPr>
+        <p:cNvPr id="1" name=""/>
+        <p:cNvGrpSpPr/>
+        <p:nvPr/>
+      </p:nvGrpSpPr>
+      <p:grpSpPr>
+        <a:xfrm>
+          <a:off x="0" y="0"/>
+          <a:ext cx="0" cy="0"/>
+          <a:chOff x="0" y="0"/>
+          <a:chExt cx="0" cy="0"/>
+        </a:xfrm>
+      </p:grpSpPr>
+      <p:sp>
+        <p:nvSpPr>
+          <p:cNvPr id="2" name="Title 1">
+            <a:extLst>
+              <a:ext uri="{FF2B5EF4-FFF2-40B4-BE49-F238E27FC236}">
+                <a16:creationId xmlns:a16="http://schemas.microsoft.com/office/drawing/2014/main" id="{F57B5DE4-5344-5527-869B-0C8136F8327F}"/>
+              </a:ext>
+            </a:extLst>
+          </p:cNvPr>
+          <p:cNvSpPr>
+            <a:spLocks noGrp="1"/>
+          </p:cNvSpPr>
+          <p:nvPr>
+            <p:ph type="title"/>
+          </p:nvPr>
+        </p:nvSpPr>
+        <p:spPr/>
+        <p:txBody>
+          <a:bodyPr/>
+          <a:lstStyle/>
+          <a:p>
+            <a:r>
+              <a:rPr lang="en-US" dirty="0"/>
+              <a:t>Friendly amendments</a:t>
+            </a:r>
+          </a:p>
+        </p:txBody>
+      </p:sp>
+      <p:sp>
+        <p:nvSpPr>
+          <p:cNvPr id="3" name="Content Placeholder 2">
+            <a:extLst>
+              <a:ext uri="{FF2B5EF4-FFF2-40B4-BE49-F238E27FC236}">
+                <a16:creationId xmlns:a16="http://schemas.microsoft.com/office/drawing/2014/main" id="{A328B26F-F56C-456C-BD13-B8B761D73BDF}"/>
+              </a:ext>
+            </a:extLst>
+          </p:cNvPr>
+          <p:cNvSpPr>
+            <a:spLocks noGrp="1"/>
+          </p:cNvSpPr>
+          <p:nvPr>
+            <p:ph idx="1"/>
+          </p:nvPr>
+        </p:nvSpPr>
+        <p:spPr/>
+        <p:txBody>
+          <a:bodyPr>
+            <a:normAutofit/>
+          </a:bodyPr>
+          <a:lstStyle/>
+          <a:p>
+            <a:r>
+              <a:rPr lang="en-US" dirty="0"/>
+              <a:t>No such thing</a:t>
+            </a:r>
+          </a:p>
+          <a:p>
+            <a:r>
+              <a:rPr lang="en-US" dirty="0"/>
+              <a:t>Except when there are: </a:t>
+            </a:r>
+            <a:r>
+              <a:rPr lang="en-US" sz="1800" dirty="0">
+                <a:hlinkClick r:id="rId2"/>
+              </a:rPr>
+              <a:t>https://github.com/AdamSwenson/parliamentary-procedure-explainers/blob/main/A%20friendly%20note%20unfriendly%20to%20friendly%20amendments.pdf</a:t>
+            </a:r>
+            <a:endParaRPr lang="en-US" sz="1800" dirty="0"/>
+          </a:p>
+          <a:p>
+            <a:endParaRPr lang="en-US" dirty="0"/>
+          </a:p>
+        </p:txBody>
+      </p:sp>
+    </p:spTree>
+    <p:extLst>
+      <p:ext uri="{BB962C8B-B14F-4D97-AF65-F5344CB8AC3E}">
+        <p14:creationId xmlns:p14="http://schemas.microsoft.com/office/powerpoint/2010/main" val="347005012"/>
+      </p:ext>
+    </p:extLst>
+  </p:cSld>
+  <p:clrMapOvr>
+    <a:masterClrMapping/>
+  </p:clrMapOvr>
+</p:sld>
+</file>
+
+<file path=ppt/slides/slide19.xml><?xml version="1.0" encoding="utf-8"?>
 <p:sld xmlns:a="http://schemas.openxmlformats.org/drawingml/2006/main" xmlns:r="http://schemas.openxmlformats.org/officeDocument/2006/relationships" xmlns:p="http://schemas.openxmlformats.org/presentationml/2006/main">
   <p:cSld>
     <p:spTree>
@@ -24275,7 +24449,64 @@
           <a:bodyPr/>
           <a:lstStyle/>
           <a:p>
+            <a:r>
+              <a:rPr lang="en-US" dirty="0"/>
+              <a:t>Note to self: Self, this is where you thought it was a good idea to show the </a:t>
+            </a:r>
+            <a:r>
+              <a:rPr lang="en-US" dirty="0" err="1"/>
+              <a:t>voteomatic</a:t>
+            </a:r>
+            <a:r>
+              <a:rPr lang="en-US" dirty="0"/>
+              <a:t> motion stack</a:t>
+            </a:r>
+          </a:p>
+          <a:p>
             <a:endParaRPr lang="en-US" dirty="0"/>
+          </a:p>
+          <a:p>
+            <a:r>
+              <a:rPr lang="en-US" dirty="0"/>
+              <a:t>Note to everyone else: These are probably easier to follow</a:t>
+            </a:r>
+          </a:p>
+          <a:p>
+            <a:pPr lvl="1"/>
+            <a:r>
+              <a:rPr lang="en-US" dirty="0">
+                <a:hlinkClick r:id="rId2"/>
+              </a:rPr>
+              <a:t>Senate procedure, a saga</a:t>
+            </a:r>
+            <a:endParaRPr lang="en-US" dirty="0"/>
+          </a:p>
+          <a:p>
+            <a:pPr lvl="2"/>
+            <a:r>
+              <a:rPr lang="en-US" dirty="0"/>
+              <a:t>Script for orientation role play with explanations </a:t>
+            </a:r>
+            <a:endParaRPr lang="en-US" dirty="0">
+              <a:hlinkClick r:id="rId3"/>
+            </a:endParaRPr>
+          </a:p>
+          <a:p>
+            <a:pPr lvl="1"/>
+            <a:r>
+              <a:rPr lang="en-US" dirty="0">
+                <a:hlinkClick r:id="rId3"/>
+              </a:rPr>
+              <a:t>Senate procedure, an iterated saga</a:t>
+            </a:r>
+            <a:endParaRPr lang="en-US" dirty="0"/>
+          </a:p>
+          <a:p>
+            <a:pPr lvl="2"/>
+            <a:r>
+              <a:rPr lang="en-US" dirty="0"/>
+              <a:t>Script for orientation role play which builds from easy to harder cases</a:t>
+            </a:r>
           </a:p>
         </p:txBody>
       </p:sp>
@@ -24292,7 +24523,137 @@
 </p:sld>
 </file>
 
-<file path=ppt/slides/slide15.xml><?xml version="1.0" encoding="utf-8"?>
+<file path=ppt/slides/slide2.xml><?xml version="1.0" encoding="utf-8"?>
+<p:sld xmlns:a="http://schemas.openxmlformats.org/drawingml/2006/main" xmlns:r="http://schemas.openxmlformats.org/officeDocument/2006/relationships" xmlns:p="http://schemas.openxmlformats.org/presentationml/2006/main">
+  <p:cSld>
+    <p:spTree>
+      <p:nvGrpSpPr>
+        <p:cNvPr id="1" name=""/>
+        <p:cNvGrpSpPr/>
+        <p:nvPr/>
+      </p:nvGrpSpPr>
+      <p:grpSpPr>
+        <a:xfrm>
+          <a:off x="0" y="0"/>
+          <a:ext cx="0" cy="0"/>
+          <a:chOff x="0" y="0"/>
+          <a:chExt cx="0" cy="0"/>
+        </a:xfrm>
+      </p:grpSpPr>
+      <p:sp>
+        <p:nvSpPr>
+          <p:cNvPr id="2" name="Title 1">
+            <a:extLst>
+              <a:ext uri="{FF2B5EF4-FFF2-40B4-BE49-F238E27FC236}">
+                <a16:creationId xmlns:a16="http://schemas.microsoft.com/office/drawing/2014/main" id="{A8E35A83-B176-B3DF-828C-206697E3A03A}"/>
+              </a:ext>
+            </a:extLst>
+          </p:cNvPr>
+          <p:cNvSpPr>
+            <a:spLocks noGrp="1"/>
+          </p:cNvSpPr>
+          <p:nvPr>
+            <p:ph type="title"/>
+          </p:nvPr>
+        </p:nvSpPr>
+        <p:spPr/>
+        <p:txBody>
+          <a:bodyPr/>
+          <a:lstStyle/>
+          <a:p>
+            <a:r>
+              <a:rPr lang="en-US" dirty="0"/>
+              <a:t>Me</a:t>
+            </a:r>
+          </a:p>
+        </p:txBody>
+      </p:sp>
+      <p:sp>
+        <p:nvSpPr>
+          <p:cNvPr id="3" name="Content Placeholder 2">
+            <a:extLst>
+              <a:ext uri="{FF2B5EF4-FFF2-40B4-BE49-F238E27FC236}">
+                <a16:creationId xmlns:a16="http://schemas.microsoft.com/office/drawing/2014/main" id="{4448D6DD-252B-9080-5EC6-5426BB8696B7}"/>
+              </a:ext>
+            </a:extLst>
+          </p:cNvPr>
+          <p:cNvSpPr>
+            <a:spLocks noGrp="1"/>
+          </p:cNvSpPr>
+          <p:nvPr>
+            <p:ph idx="1"/>
+          </p:nvPr>
+        </p:nvSpPr>
+        <p:spPr/>
+        <p:txBody>
+          <a:bodyPr/>
+          <a:lstStyle/>
+          <a:p>
+            <a:r>
+              <a:rPr lang="en-US" dirty="0"/>
+              <a:t>Adam Swenson</a:t>
+            </a:r>
+          </a:p>
+          <a:p>
+            <a:pPr lvl="1"/>
+            <a:r>
+              <a:rPr lang="en-US" dirty="0">
+                <a:hlinkClick r:id="rId2"/>
+              </a:rPr>
+              <a:t>Adam.Swenson@csun.edu</a:t>
+            </a:r>
+            <a:endParaRPr lang="en-US" dirty="0"/>
+          </a:p>
+          <a:p>
+            <a:r>
+              <a:rPr lang="en-US" dirty="0"/>
+              <a:t>Professor of Philosophy at CSU Northridge; recovering Senate Chair</a:t>
+            </a:r>
+          </a:p>
+          <a:p>
+            <a:pPr lvl="1"/>
+            <a:r>
+              <a:rPr lang="en-US" dirty="0"/>
+              <a:t>I specialize in philosophical and ethical issues concerning pain and pain medicine.</a:t>
+            </a:r>
+          </a:p>
+          <a:p>
+            <a:r>
+              <a:rPr lang="en-US" dirty="0"/>
+              <a:t>Long time Academic Senate of the California State University (ASCSU) parliamentarian</a:t>
+            </a:r>
+          </a:p>
+          <a:p>
+            <a:pPr lvl="1"/>
+            <a:r>
+              <a:rPr lang="en-US" dirty="0"/>
+              <a:t>Disclaimer: I’m here as someone passionate about </a:t>
+            </a:r>
+            <a:r>
+              <a:rPr lang="en-US" dirty="0" err="1"/>
+              <a:t>Robz</a:t>
+            </a:r>
+            <a:r>
+              <a:rPr lang="en-US" dirty="0"/>
+              <a:t>, not as part of my official capacity.</a:t>
+            </a:r>
+          </a:p>
+        </p:txBody>
+      </p:sp>
+    </p:spTree>
+    <p:extLst>
+      <p:ext uri="{BB962C8B-B14F-4D97-AF65-F5344CB8AC3E}">
+        <p14:creationId xmlns:p14="http://schemas.microsoft.com/office/powerpoint/2010/main" val="3957391887"/>
+      </p:ext>
+    </p:extLst>
+  </p:cSld>
+  <p:clrMapOvr>
+    <a:masterClrMapping/>
+  </p:clrMapOvr>
+</p:sld>
+</file>
+
+<file path=ppt/slides/slide20.xml><?xml version="1.0" encoding="utf-8"?>
 <p:sld xmlns:a="http://schemas.openxmlformats.org/drawingml/2006/main" xmlns:r="http://schemas.openxmlformats.org/officeDocument/2006/relationships" xmlns:p="http://schemas.openxmlformats.org/presentationml/2006/main">
   <p:cSld>
     <p:bg>
@@ -25201,143 +25562,7 @@
 </p:sld>
 </file>
 
-<file path=ppt/slides/slide16.xml><?xml version="1.0" encoding="utf-8"?>
-<p:sld xmlns:a="http://schemas.openxmlformats.org/drawingml/2006/main" xmlns:r="http://schemas.openxmlformats.org/officeDocument/2006/relationships" xmlns:p="http://schemas.openxmlformats.org/presentationml/2006/main" show="0">
-  <p:cSld>
-    <p:spTree>
-      <p:nvGrpSpPr>
-        <p:cNvPr id="1" name=""/>
-        <p:cNvGrpSpPr/>
-        <p:nvPr/>
-      </p:nvGrpSpPr>
-      <p:grpSpPr>
-        <a:xfrm>
-          <a:off x="0" y="0"/>
-          <a:ext cx="0" cy="0"/>
-          <a:chOff x="0" y="0"/>
-          <a:chExt cx="0" cy="0"/>
-        </a:xfrm>
-      </p:grpSpPr>
-      <p:sp>
-        <p:nvSpPr>
-          <p:cNvPr id="2" name="Title 1">
-            <a:extLst>
-              <a:ext uri="{FF2B5EF4-FFF2-40B4-BE49-F238E27FC236}">
-                <a16:creationId xmlns:a16="http://schemas.microsoft.com/office/drawing/2014/main" id="{EE21483D-0631-BF89-992B-D251721EE8A0}"/>
-              </a:ext>
-            </a:extLst>
-          </p:cNvPr>
-          <p:cNvSpPr>
-            <a:spLocks noGrp="1"/>
-          </p:cNvSpPr>
-          <p:nvPr>
-            <p:ph type="title"/>
-          </p:nvPr>
-        </p:nvSpPr>
-        <p:spPr/>
-        <p:txBody>
-          <a:bodyPr/>
-          <a:lstStyle/>
-          <a:p>
-            <a:r>
-              <a:rPr lang="en-US" dirty="0"/>
-              <a:t>How many votes does that take?</a:t>
-            </a:r>
-          </a:p>
-        </p:txBody>
-      </p:sp>
-      <p:sp>
-        <p:nvSpPr>
-          <p:cNvPr id="3" name="Content Placeholder 2">
-            <a:extLst>
-              <a:ext uri="{FF2B5EF4-FFF2-40B4-BE49-F238E27FC236}">
-                <a16:creationId xmlns:a16="http://schemas.microsoft.com/office/drawing/2014/main" id="{621695B8-4F7F-D10F-A6C3-CF4A27CA5C0F}"/>
-              </a:ext>
-            </a:extLst>
-          </p:cNvPr>
-          <p:cNvSpPr>
-            <a:spLocks noGrp="1"/>
-          </p:cNvSpPr>
-          <p:nvPr>
-            <p:ph idx="1"/>
-          </p:nvPr>
-        </p:nvSpPr>
-        <p:spPr/>
-        <p:txBody>
-          <a:bodyPr>
-            <a:normAutofit/>
-          </a:bodyPr>
-          <a:lstStyle/>
-          <a:p>
-            <a:r>
-              <a:rPr lang="en-US" dirty="0"/>
-              <a:t>ACTION: The body must be able to act. </a:t>
-            </a:r>
-          </a:p>
-          <a:p>
-            <a:pPr lvl="1"/>
-            <a:r>
-              <a:rPr lang="en-US" dirty="0"/>
-              <a:t>The body acts when a majority of members want it to.</a:t>
-            </a:r>
-          </a:p>
-          <a:p>
-            <a:pPr lvl="2"/>
-            <a:r>
-              <a:rPr lang="en-US" dirty="0"/>
-              <a:t>Why a majority?</a:t>
-            </a:r>
-          </a:p>
-          <a:p>
-            <a:pPr lvl="3"/>
-            <a:r>
-              <a:rPr lang="en-US" dirty="0"/>
-              <a:t>Simple analogy: Imagine you are completely indifferent between 2 restaurants ---you like them equally as much. If you think it is ever so slightly more likely that you will enjoy restaurant A tonight more than restaurant B, you will act by going to restaurant A </a:t>
-            </a:r>
-          </a:p>
-          <a:p>
-            <a:pPr lvl="3"/>
-            <a:r>
-              <a:rPr lang="en-US" dirty="0"/>
-              <a:t>I have a real philosophical explanation of why a majority for the masochists. Be prepared for metaphysics.</a:t>
-            </a:r>
-          </a:p>
-          <a:p>
-            <a:r>
-              <a:rPr lang="en-US" dirty="0"/>
-              <a:t>EQUALITY: Everyone must have equal opportunity to contribute.</a:t>
-            </a:r>
-          </a:p>
-          <a:p>
-            <a:pPr lvl="1"/>
-            <a:r>
-              <a:rPr lang="en-US" dirty="0"/>
-              <a:t>Obviously, this is in tension with ACTION. A few members can’t be allowed to prevent the body from acting. So sometimes it is necessary to limit rights.</a:t>
-            </a:r>
-          </a:p>
-          <a:p>
-            <a:pPr lvl="1"/>
-            <a:r>
-              <a:rPr lang="en-US" dirty="0"/>
-              <a:t>Taking away/limiting rights requires a higher threshold. Usually 2/3</a:t>
-            </a:r>
-          </a:p>
-        </p:txBody>
-      </p:sp>
-    </p:spTree>
-    <p:extLst>
-      <p:ext uri="{BB962C8B-B14F-4D97-AF65-F5344CB8AC3E}">
-        <p14:creationId xmlns:p14="http://schemas.microsoft.com/office/powerpoint/2010/main" val="681814431"/>
-      </p:ext>
-    </p:extLst>
-  </p:cSld>
-  <p:clrMapOvr>
-    <a:masterClrMapping/>
-  </p:clrMapOvr>
-</p:sld>
-</file>
-
-<file path=ppt/slides/slide17.xml><?xml version="1.0" encoding="utf-8"?>
+<file path=ppt/slides/slide21.xml><?xml version="1.0" encoding="utf-8"?>
 <p:sld xmlns:a="http://schemas.openxmlformats.org/drawingml/2006/main" xmlns:r="http://schemas.openxmlformats.org/officeDocument/2006/relationships" xmlns:p="http://schemas.openxmlformats.org/presentationml/2006/main">
   <p:cSld>
     <p:spTree>
@@ -25492,7 +25717,7 @@
 </p:sld>
 </file>
 
-<file path=ppt/slides/slide18.xml><?xml version="1.0" encoding="utf-8"?>
+<file path=ppt/slides/slide22.xml><?xml version="1.0" encoding="utf-8"?>
 <p:sld xmlns:a="http://schemas.openxmlformats.org/drawingml/2006/main" xmlns:r="http://schemas.openxmlformats.org/officeDocument/2006/relationships" xmlns:p="http://schemas.openxmlformats.org/presentationml/2006/main">
   <p:cSld>
     <p:spTree>
@@ -25610,7 +25835,7 @@
 </p:sld>
 </file>
 
-<file path=ppt/slides/slide19.xml><?xml version="1.0" encoding="utf-8"?>
+<file path=ppt/slides/slide23.xml><?xml version="1.0" encoding="utf-8"?>
 <p:sld xmlns:a="http://schemas.openxmlformats.org/drawingml/2006/main" xmlns:r="http://schemas.openxmlformats.org/officeDocument/2006/relationships" xmlns:p="http://schemas.openxmlformats.org/presentationml/2006/main">
   <p:cSld>
     <p:spTree>
@@ -25696,137 +25921,7 @@
 </p:sld>
 </file>
 
-<file path=ppt/slides/slide2.xml><?xml version="1.0" encoding="utf-8"?>
-<p:sld xmlns:a="http://schemas.openxmlformats.org/drawingml/2006/main" xmlns:r="http://schemas.openxmlformats.org/officeDocument/2006/relationships" xmlns:p="http://schemas.openxmlformats.org/presentationml/2006/main">
-  <p:cSld>
-    <p:spTree>
-      <p:nvGrpSpPr>
-        <p:cNvPr id="1" name=""/>
-        <p:cNvGrpSpPr/>
-        <p:nvPr/>
-      </p:nvGrpSpPr>
-      <p:grpSpPr>
-        <a:xfrm>
-          <a:off x="0" y="0"/>
-          <a:ext cx="0" cy="0"/>
-          <a:chOff x="0" y="0"/>
-          <a:chExt cx="0" cy="0"/>
-        </a:xfrm>
-      </p:grpSpPr>
-      <p:sp>
-        <p:nvSpPr>
-          <p:cNvPr id="2" name="Title 1">
-            <a:extLst>
-              <a:ext uri="{FF2B5EF4-FFF2-40B4-BE49-F238E27FC236}">
-                <a16:creationId xmlns:a16="http://schemas.microsoft.com/office/drawing/2014/main" id="{A8E35A83-B176-B3DF-828C-206697E3A03A}"/>
-              </a:ext>
-            </a:extLst>
-          </p:cNvPr>
-          <p:cNvSpPr>
-            <a:spLocks noGrp="1"/>
-          </p:cNvSpPr>
-          <p:nvPr>
-            <p:ph type="title"/>
-          </p:nvPr>
-        </p:nvSpPr>
-        <p:spPr/>
-        <p:txBody>
-          <a:bodyPr/>
-          <a:lstStyle/>
-          <a:p>
-            <a:r>
-              <a:rPr lang="en-US" dirty="0"/>
-              <a:t>Me</a:t>
-            </a:r>
-          </a:p>
-        </p:txBody>
-      </p:sp>
-      <p:sp>
-        <p:nvSpPr>
-          <p:cNvPr id="3" name="Content Placeholder 2">
-            <a:extLst>
-              <a:ext uri="{FF2B5EF4-FFF2-40B4-BE49-F238E27FC236}">
-                <a16:creationId xmlns:a16="http://schemas.microsoft.com/office/drawing/2014/main" id="{4448D6DD-252B-9080-5EC6-5426BB8696B7}"/>
-              </a:ext>
-            </a:extLst>
-          </p:cNvPr>
-          <p:cNvSpPr>
-            <a:spLocks noGrp="1"/>
-          </p:cNvSpPr>
-          <p:nvPr>
-            <p:ph idx="1"/>
-          </p:nvPr>
-        </p:nvSpPr>
-        <p:spPr/>
-        <p:txBody>
-          <a:bodyPr/>
-          <a:lstStyle/>
-          <a:p>
-            <a:r>
-              <a:rPr lang="en-US" dirty="0"/>
-              <a:t>Adam Swenson</a:t>
-            </a:r>
-          </a:p>
-          <a:p>
-            <a:pPr lvl="1"/>
-            <a:r>
-              <a:rPr lang="en-US" dirty="0">
-                <a:hlinkClick r:id="rId2"/>
-              </a:rPr>
-              <a:t>Adam.Swenson@csun.edu</a:t>
-            </a:r>
-            <a:endParaRPr lang="en-US" dirty="0"/>
-          </a:p>
-          <a:p>
-            <a:r>
-              <a:rPr lang="en-US" dirty="0"/>
-              <a:t>Professor of Philosophy at CSU Northridge; recovering Senate Chair</a:t>
-            </a:r>
-          </a:p>
-          <a:p>
-            <a:pPr lvl="1"/>
-            <a:r>
-              <a:rPr lang="en-US" dirty="0"/>
-              <a:t>I specialize in philosophical and ethical issues concerning pain and pain medicine.</a:t>
-            </a:r>
-          </a:p>
-          <a:p>
-            <a:r>
-              <a:rPr lang="en-US" dirty="0"/>
-              <a:t>Long time Academic Senate of the California State University (ASCSU) parliamentarian</a:t>
-            </a:r>
-          </a:p>
-          <a:p>
-            <a:pPr lvl="1"/>
-            <a:r>
-              <a:rPr lang="en-US" dirty="0"/>
-              <a:t>Disclaimer: I’m here as someone passionate about </a:t>
-            </a:r>
-            <a:r>
-              <a:rPr lang="en-US" dirty="0" err="1"/>
-              <a:t>Robz</a:t>
-            </a:r>
-            <a:r>
-              <a:rPr lang="en-US" dirty="0"/>
-              <a:t>, not as part of my official capacity.</a:t>
-            </a:r>
-          </a:p>
-        </p:txBody>
-      </p:sp>
-    </p:spTree>
-    <p:extLst>
-      <p:ext uri="{BB962C8B-B14F-4D97-AF65-F5344CB8AC3E}">
-        <p14:creationId xmlns:p14="http://schemas.microsoft.com/office/powerpoint/2010/main" val="3957391887"/>
-      </p:ext>
-    </p:extLst>
-  </p:cSld>
-  <p:clrMapOvr>
-    <a:masterClrMapping/>
-  </p:clrMapOvr>
-</p:sld>
-</file>
-
-<file path=ppt/slides/slide20.xml><?xml version="1.0" encoding="utf-8"?>
+<file path=ppt/slides/slide24.xml><?xml version="1.0" encoding="utf-8"?>
 <p:sld xmlns:a="http://schemas.openxmlformats.org/drawingml/2006/main" xmlns:r="http://schemas.openxmlformats.org/officeDocument/2006/relationships" xmlns:p="http://schemas.openxmlformats.org/presentationml/2006/main">
   <p:cSld>
     <p:spTree>
@@ -25933,660 +26028,7 @@
 </p:sld>
 </file>
 
-<file path=ppt/slides/slide21.xml><?xml version="1.0" encoding="utf-8"?>
-<p:sld xmlns:a="http://schemas.openxmlformats.org/drawingml/2006/main" xmlns:r="http://schemas.openxmlformats.org/officeDocument/2006/relationships" xmlns:p="http://schemas.openxmlformats.org/presentationml/2006/main">
-  <p:cSld>
-    <p:bg>
-      <p:bgPr>
-        <a:solidFill>
-          <a:srgbClr val="000000"/>
-        </a:solidFill>
-        <a:effectLst/>
-      </p:bgPr>
-    </p:bg>
-    <p:spTree>
-      <p:nvGrpSpPr>
-        <p:cNvPr id="1" name=""/>
-        <p:cNvGrpSpPr/>
-        <p:nvPr/>
-      </p:nvGrpSpPr>
-      <p:grpSpPr>
-        <a:xfrm>
-          <a:off x="0" y="0"/>
-          <a:ext cx="0" cy="0"/>
-          <a:chOff x="0" y="0"/>
-          <a:chExt cx="0" cy="0"/>
-        </a:xfrm>
-      </p:grpSpPr>
-      <p:pic>
-        <p:nvPicPr>
-          <p:cNvPr id="20" name="Picture 19" descr="Alligators in shallow water">
-            <a:extLst>
-              <a:ext uri="{FF2B5EF4-FFF2-40B4-BE49-F238E27FC236}">
-                <a16:creationId xmlns:a16="http://schemas.microsoft.com/office/drawing/2014/main" id="{4D674205-DFE9-F178-2ED3-774B622E4AC7}"/>
-              </a:ext>
-            </a:extLst>
-          </p:cNvPr>
-          <p:cNvPicPr>
-            <a:picLocks noChangeAspect="1"/>
-          </p:cNvPicPr>
-          <p:nvPr/>
-        </p:nvPicPr>
-        <p:blipFill rotWithShape="1">
-          <a:blip r:embed="rId3">
-            <a:alphaModFix amt="50000"/>
-          </a:blip>
-          <a:srcRect t="12165" b="3565"/>
-          <a:stretch/>
-        </p:blipFill>
-        <p:spPr>
-          <a:xfrm>
-            <a:off x="20" y="1"/>
-            <a:ext cx="12191980" cy="6857999"/>
-          </a:xfrm>
-          <a:prstGeom prst="rect">
-            <a:avLst/>
-          </a:prstGeom>
-        </p:spPr>
-      </p:pic>
-      <p:sp>
-        <p:nvSpPr>
-          <p:cNvPr id="4" name="Title 3">
-            <a:extLst>
-              <a:ext uri="{FF2B5EF4-FFF2-40B4-BE49-F238E27FC236}">
-                <a16:creationId xmlns:a16="http://schemas.microsoft.com/office/drawing/2014/main" id="{C9D914CA-03E1-68DA-097E-FDDC73518655}"/>
-              </a:ext>
-            </a:extLst>
-          </p:cNvPr>
-          <p:cNvSpPr>
-            <a:spLocks noGrp="1"/>
-          </p:cNvSpPr>
-          <p:nvPr>
-            <p:ph type="title"/>
-          </p:nvPr>
-        </p:nvSpPr>
-        <p:spPr/>
-        <p:txBody>
-          <a:bodyPr vert="horz" lIns="91440" tIns="45720" rIns="91440" bIns="45720" rtlCol="0" anchor="b">
-            <a:normAutofit/>
-          </a:bodyPr>
-          <a:lstStyle/>
-          <a:p>
-            <a:pPr algn="ctr"/>
-            <a:r>
-              <a:rPr lang="en-US">
-                <a:solidFill>
-                  <a:srgbClr val="FFFFFF"/>
-                </a:solidFill>
-              </a:rPr>
-              <a:t>Amendments</a:t>
-            </a:r>
-          </a:p>
-        </p:txBody>
-      </p:sp>
-      <p:sp>
-        <p:nvSpPr>
-          <p:cNvPr id="5" name="Text Placeholder 4">
-            <a:extLst>
-              <a:ext uri="{FF2B5EF4-FFF2-40B4-BE49-F238E27FC236}">
-                <a16:creationId xmlns:a16="http://schemas.microsoft.com/office/drawing/2014/main" id="{3ABB89B0-23F7-0639-7027-71AE8ED52188}"/>
-              </a:ext>
-            </a:extLst>
-          </p:cNvPr>
-          <p:cNvSpPr>
-            <a:spLocks noGrp="1"/>
-          </p:cNvSpPr>
-          <p:nvPr>
-            <p:ph type="body" idx="1"/>
-          </p:nvPr>
-        </p:nvSpPr>
-        <p:spPr/>
-        <p:txBody>
-          <a:bodyPr vert="horz" lIns="91440" tIns="45720" rIns="91440" bIns="45720" rtlCol="0">
-            <a:normAutofit/>
-          </a:bodyPr>
-          <a:lstStyle/>
-          <a:p>
-            <a:pPr algn="ctr"/>
-            <a:r>
-              <a:rPr lang="en-US" dirty="0">
-                <a:solidFill>
-                  <a:srgbClr val="FFFFFF"/>
-                </a:solidFill>
-              </a:rPr>
-              <a:t>Here be dragons</a:t>
-            </a:r>
-          </a:p>
-        </p:txBody>
-      </p:sp>
-    </p:spTree>
-    <p:extLst>
-      <p:ext uri="{BB962C8B-B14F-4D97-AF65-F5344CB8AC3E}">
-        <p14:creationId xmlns:p14="http://schemas.microsoft.com/office/powerpoint/2010/main" val="1504253236"/>
-      </p:ext>
-    </p:extLst>
-  </p:cSld>
-  <p:clrMapOvr>
-    <a:overrideClrMapping bg1="dk1" tx1="lt1" bg2="dk2" tx2="lt2" accent1="accent1" accent2="accent2" accent3="accent3" accent4="accent4" accent5="accent5" accent6="accent6" hlink="hlink" folHlink="folHlink"/>
-  </p:clrMapOvr>
-</p:sld>
-</file>
-
-<file path=ppt/slides/slide22.xml><?xml version="1.0" encoding="utf-8"?>
-<p:sld xmlns:a="http://schemas.openxmlformats.org/drawingml/2006/main" xmlns:r="http://schemas.openxmlformats.org/officeDocument/2006/relationships" xmlns:p="http://schemas.openxmlformats.org/presentationml/2006/main">
-  <p:cSld>
-    <p:spTree>
-      <p:nvGrpSpPr>
-        <p:cNvPr id="1" name=""/>
-        <p:cNvGrpSpPr/>
-        <p:nvPr/>
-      </p:nvGrpSpPr>
-      <p:grpSpPr>
-        <a:xfrm>
-          <a:off x="0" y="0"/>
-          <a:ext cx="0" cy="0"/>
-          <a:chOff x="0" y="0"/>
-          <a:chExt cx="0" cy="0"/>
-        </a:xfrm>
-      </p:grpSpPr>
-      <p:sp>
-        <p:nvSpPr>
-          <p:cNvPr id="4" name="Title 3">
-            <a:extLst>
-              <a:ext uri="{FF2B5EF4-FFF2-40B4-BE49-F238E27FC236}">
-                <a16:creationId xmlns:a16="http://schemas.microsoft.com/office/drawing/2014/main" id="{4C010BC8-8145-9047-193C-C512503F16B5}"/>
-              </a:ext>
-            </a:extLst>
-          </p:cNvPr>
-          <p:cNvSpPr>
-            <a:spLocks noGrp="1"/>
-          </p:cNvSpPr>
-          <p:nvPr>
-            <p:ph type="title"/>
-          </p:nvPr>
-        </p:nvSpPr>
-        <p:spPr/>
-        <p:txBody>
-          <a:bodyPr/>
-          <a:lstStyle/>
-          <a:p>
-            <a:r>
-              <a:rPr lang="en-US" dirty="0"/>
-              <a:t>Basic rule</a:t>
-            </a:r>
-          </a:p>
-        </p:txBody>
-      </p:sp>
-      <p:sp>
-        <p:nvSpPr>
-          <p:cNvPr id="5" name="Content Placeholder 4">
-            <a:extLst>
-              <a:ext uri="{FF2B5EF4-FFF2-40B4-BE49-F238E27FC236}">
-                <a16:creationId xmlns:a16="http://schemas.microsoft.com/office/drawing/2014/main" id="{F4E05510-DD9A-949C-6B6F-893F26A96B9E}"/>
-              </a:ext>
-            </a:extLst>
-          </p:cNvPr>
-          <p:cNvSpPr>
-            <a:spLocks noGrp="1"/>
-          </p:cNvSpPr>
-          <p:nvPr>
-            <p:ph idx="1"/>
-          </p:nvPr>
-        </p:nvSpPr>
-        <p:spPr/>
-        <p:txBody>
-          <a:bodyPr/>
-          <a:lstStyle/>
-          <a:p>
-            <a:r>
-              <a:rPr lang="en-US" dirty="0"/>
-              <a:t>NO DOUBLE CONSIDERATION</a:t>
-            </a:r>
-          </a:p>
-          <a:p>
-            <a:pPr lvl="1"/>
-            <a:r>
-              <a:rPr lang="en-US" dirty="0"/>
-              <a:t>Once something is decided, it can’t be taken up again (without an intervening motion to reconsider, et cetera)</a:t>
-            </a:r>
-          </a:p>
-          <a:p>
-            <a:r>
-              <a:rPr lang="en-US" dirty="0"/>
-              <a:t>What this actually means is incredibly difficult in practice</a:t>
-            </a:r>
-          </a:p>
-          <a:p>
-            <a:pPr lvl="1"/>
-            <a:r>
-              <a:rPr lang="en-US" dirty="0"/>
-              <a:t>I’m looking at you, ASCSU</a:t>
-            </a:r>
-          </a:p>
-        </p:txBody>
-      </p:sp>
-    </p:spTree>
-    <p:extLst>
-      <p:ext uri="{BB962C8B-B14F-4D97-AF65-F5344CB8AC3E}">
-        <p14:creationId xmlns:p14="http://schemas.microsoft.com/office/powerpoint/2010/main" val="2995829816"/>
-      </p:ext>
-    </p:extLst>
-  </p:cSld>
-  <p:clrMapOvr>
-    <a:masterClrMapping/>
-  </p:clrMapOvr>
-</p:sld>
-</file>
-
-<file path=ppt/slides/slide23.xml><?xml version="1.0" encoding="utf-8"?>
-<p:sld xmlns:a="http://schemas.openxmlformats.org/drawingml/2006/main" xmlns:r="http://schemas.openxmlformats.org/officeDocument/2006/relationships" xmlns:p="http://schemas.openxmlformats.org/presentationml/2006/main">
-  <p:cSld>
-    <p:spTree>
-      <p:nvGrpSpPr>
-        <p:cNvPr id="1" name=""/>
-        <p:cNvGrpSpPr/>
-        <p:nvPr/>
-      </p:nvGrpSpPr>
-      <p:grpSpPr>
-        <a:xfrm>
-          <a:off x="0" y="0"/>
-          <a:ext cx="0" cy="0"/>
-          <a:chOff x="0" y="0"/>
-          <a:chExt cx="0" cy="0"/>
-        </a:xfrm>
-      </p:grpSpPr>
-      <p:sp>
-        <p:nvSpPr>
-          <p:cNvPr id="2" name="Title 1">
-            <a:extLst>
-              <a:ext uri="{FF2B5EF4-FFF2-40B4-BE49-F238E27FC236}">
-                <a16:creationId xmlns:a16="http://schemas.microsoft.com/office/drawing/2014/main" id="{AC05B117-5ED8-7CCC-672A-2193F398D138}"/>
-              </a:ext>
-            </a:extLst>
-          </p:cNvPr>
-          <p:cNvSpPr>
-            <a:spLocks noGrp="1"/>
-          </p:cNvSpPr>
-          <p:nvPr>
-            <p:ph type="title"/>
-          </p:nvPr>
-        </p:nvSpPr>
-        <p:spPr/>
-        <p:txBody>
-          <a:bodyPr/>
-          <a:lstStyle/>
-          <a:p>
-            <a:r>
-              <a:rPr lang="en-US" dirty="0"/>
-              <a:t>Who can amend?</a:t>
-            </a:r>
-          </a:p>
-        </p:txBody>
-      </p:sp>
-      <p:sp>
-        <p:nvSpPr>
-          <p:cNvPr id="3" name="Content Placeholder 2">
-            <a:extLst>
-              <a:ext uri="{FF2B5EF4-FFF2-40B4-BE49-F238E27FC236}">
-                <a16:creationId xmlns:a16="http://schemas.microsoft.com/office/drawing/2014/main" id="{648ADC4C-9975-BF7F-2743-69729759C6E6}"/>
-              </a:ext>
-            </a:extLst>
-          </p:cNvPr>
-          <p:cNvSpPr>
-            <a:spLocks noGrp="1"/>
-          </p:cNvSpPr>
-          <p:nvPr>
-            <p:ph idx="1"/>
-          </p:nvPr>
-        </p:nvSpPr>
-        <p:spPr/>
-        <p:txBody>
-          <a:bodyPr/>
-          <a:lstStyle/>
-          <a:p>
-            <a:r>
-              <a:rPr lang="en-US" dirty="0"/>
-              <a:t>It is sometimes thought that:</a:t>
-            </a:r>
-          </a:p>
-          <a:p>
-            <a:pPr lvl="1"/>
-            <a:r>
-              <a:rPr lang="en-US" dirty="0">
-                <a:effectLst/>
-              </a:rPr>
-              <a:t>[x] You can’t offer an amendment to a motion that you intend to oppose. </a:t>
-            </a:r>
-          </a:p>
-          <a:p>
-            <a:endParaRPr lang="en-US" dirty="0"/>
-          </a:p>
-          <a:p>
-            <a:r>
-              <a:rPr lang="en-US" dirty="0"/>
-              <a:t>EQUALITY shows this is wrong: Opponents have a right to try to make whatever passes as palatable to them as possible. </a:t>
-            </a:r>
-          </a:p>
-        </p:txBody>
-      </p:sp>
-    </p:spTree>
-    <p:extLst>
-      <p:ext uri="{BB962C8B-B14F-4D97-AF65-F5344CB8AC3E}">
-        <p14:creationId xmlns:p14="http://schemas.microsoft.com/office/powerpoint/2010/main" val="3673029960"/>
-      </p:ext>
-    </p:extLst>
-  </p:cSld>
-  <p:clrMapOvr>
-    <a:masterClrMapping/>
-  </p:clrMapOvr>
-</p:sld>
-</file>
-
-<file path=ppt/slides/slide24.xml><?xml version="1.0" encoding="utf-8"?>
-<p:sld xmlns:a="http://schemas.openxmlformats.org/drawingml/2006/main" xmlns:r="http://schemas.openxmlformats.org/officeDocument/2006/relationships" xmlns:p="http://schemas.openxmlformats.org/presentationml/2006/main">
-  <p:cSld>
-    <p:spTree>
-      <p:nvGrpSpPr>
-        <p:cNvPr id="1" name=""/>
-        <p:cNvGrpSpPr/>
-        <p:nvPr/>
-      </p:nvGrpSpPr>
-      <p:grpSpPr>
-        <a:xfrm>
-          <a:off x="0" y="0"/>
-          <a:ext cx="0" cy="0"/>
-          <a:chOff x="0" y="0"/>
-          <a:chExt cx="0" cy="0"/>
-        </a:xfrm>
-      </p:grpSpPr>
-      <p:sp>
-        <p:nvSpPr>
-          <p:cNvPr id="6" name="Title 5">
-            <a:extLst>
-              <a:ext uri="{FF2B5EF4-FFF2-40B4-BE49-F238E27FC236}">
-                <a16:creationId xmlns:a16="http://schemas.microsoft.com/office/drawing/2014/main" id="{84FB680E-BFDB-5409-17DC-585450ADBF4F}"/>
-              </a:ext>
-            </a:extLst>
-          </p:cNvPr>
-          <p:cNvSpPr>
-            <a:spLocks noGrp="1"/>
-          </p:cNvSpPr>
-          <p:nvPr>
-            <p:ph type="title"/>
-          </p:nvPr>
-        </p:nvSpPr>
-        <p:spPr/>
-        <p:txBody>
-          <a:bodyPr/>
-          <a:lstStyle/>
-          <a:p>
-            <a:r>
-              <a:rPr lang="en-US" dirty="0"/>
-              <a:t>Amending amendments</a:t>
-            </a:r>
-          </a:p>
-        </p:txBody>
-      </p:sp>
-      <p:sp>
-        <p:nvSpPr>
-          <p:cNvPr id="7" name="Content Placeholder 6">
-            <a:extLst>
-              <a:ext uri="{FF2B5EF4-FFF2-40B4-BE49-F238E27FC236}">
-                <a16:creationId xmlns:a16="http://schemas.microsoft.com/office/drawing/2014/main" id="{09BEF616-358E-1D24-BCF0-C670EB10E5CC}"/>
-              </a:ext>
-            </a:extLst>
-          </p:cNvPr>
-          <p:cNvSpPr>
-            <a:spLocks noGrp="1"/>
-          </p:cNvSpPr>
-          <p:nvPr>
-            <p:ph idx="1"/>
-          </p:nvPr>
-        </p:nvSpPr>
-        <p:spPr/>
-        <p:txBody>
-          <a:bodyPr/>
-          <a:lstStyle/>
-          <a:p>
-            <a:r>
-              <a:rPr lang="en-US" dirty="0"/>
-              <a:t>Yes. You can amend any amendment. </a:t>
-            </a:r>
-          </a:p>
-          <a:p>
-            <a:r>
-              <a:rPr lang="en-US" dirty="0"/>
-              <a:t>The madness stops there. You cannot amend an amendment to an amendment. </a:t>
-            </a:r>
-          </a:p>
-          <a:p>
-            <a:pPr lvl="1"/>
-            <a:r>
-              <a:rPr lang="en-US" dirty="0"/>
-              <a:t>Vote down the second order amendment (or first and second order amendment) and propose a new one.</a:t>
-            </a:r>
-          </a:p>
-        </p:txBody>
-      </p:sp>
-    </p:spTree>
-    <p:extLst>
-      <p:ext uri="{BB962C8B-B14F-4D97-AF65-F5344CB8AC3E}">
-        <p14:creationId xmlns:p14="http://schemas.microsoft.com/office/powerpoint/2010/main" val="1119591584"/>
-      </p:ext>
-    </p:extLst>
-  </p:cSld>
-  <p:clrMapOvr>
-    <a:masterClrMapping/>
-  </p:clrMapOvr>
-</p:sld>
-</file>
-
 <file path=ppt/slides/slide25.xml><?xml version="1.0" encoding="utf-8"?>
-<p:sld xmlns:a="http://schemas.openxmlformats.org/drawingml/2006/main" xmlns:r="http://schemas.openxmlformats.org/officeDocument/2006/relationships" xmlns:p="http://schemas.openxmlformats.org/presentationml/2006/main">
-  <p:cSld>
-    <p:spTree>
-      <p:nvGrpSpPr>
-        <p:cNvPr id="1" name=""/>
-        <p:cNvGrpSpPr/>
-        <p:nvPr/>
-      </p:nvGrpSpPr>
-      <p:grpSpPr>
-        <a:xfrm>
-          <a:off x="0" y="0"/>
-          <a:ext cx="0" cy="0"/>
-          <a:chOff x="0" y="0"/>
-          <a:chExt cx="0" cy="0"/>
-        </a:xfrm>
-      </p:grpSpPr>
-      <p:sp>
-        <p:nvSpPr>
-          <p:cNvPr id="2" name="Title 1">
-            <a:extLst>
-              <a:ext uri="{FF2B5EF4-FFF2-40B4-BE49-F238E27FC236}">
-                <a16:creationId xmlns:a16="http://schemas.microsoft.com/office/drawing/2014/main" id="{BB4E971B-9B3D-88AF-8747-FF126E687DD9}"/>
-              </a:ext>
-            </a:extLst>
-          </p:cNvPr>
-          <p:cNvSpPr>
-            <a:spLocks noGrp="1"/>
-          </p:cNvSpPr>
-          <p:nvPr>
-            <p:ph type="title"/>
-          </p:nvPr>
-        </p:nvSpPr>
-        <p:spPr/>
-        <p:txBody>
-          <a:bodyPr/>
-          <a:lstStyle/>
-          <a:p>
-            <a:r>
-              <a:rPr lang="en-US" dirty="0"/>
-              <a:t>Best practices to stay out of trouble</a:t>
-            </a:r>
-          </a:p>
-        </p:txBody>
-      </p:sp>
-      <p:sp>
-        <p:nvSpPr>
-          <p:cNvPr id="3" name="Content Placeholder 2">
-            <a:extLst>
-              <a:ext uri="{FF2B5EF4-FFF2-40B4-BE49-F238E27FC236}">
-                <a16:creationId xmlns:a16="http://schemas.microsoft.com/office/drawing/2014/main" id="{4F054232-6CAF-B45D-B878-A546E922DDCD}"/>
-              </a:ext>
-            </a:extLst>
-          </p:cNvPr>
-          <p:cNvSpPr>
-            <a:spLocks noGrp="1"/>
-          </p:cNvSpPr>
-          <p:nvPr>
-            <p:ph idx="1"/>
-          </p:nvPr>
-        </p:nvSpPr>
-        <p:spPr/>
-        <p:txBody>
-          <a:bodyPr/>
-          <a:lstStyle/>
-          <a:p>
-            <a:r>
-              <a:rPr lang="en-US" dirty="0"/>
-              <a:t>Keep amendments simple. Each amendment should deal with as compact a matter as possible</a:t>
-            </a:r>
-          </a:p>
-          <a:p>
-            <a:r>
-              <a:rPr lang="en-US" dirty="0"/>
-              <a:t>Avoid amending across paragraphs/RESOLVED clauses. </a:t>
-            </a:r>
-          </a:p>
-          <a:p>
-            <a:r>
-              <a:rPr lang="en-US" dirty="0"/>
-              <a:t>A series of amendments should always be broken up unless dealing with them separately is going to require multiple votes on the same thing (e.g., every time it says ‘cat’ replace with ‘dog’)</a:t>
-            </a:r>
-          </a:p>
-          <a:p>
-            <a:endParaRPr lang="en-US" dirty="0"/>
-          </a:p>
-        </p:txBody>
-      </p:sp>
-    </p:spTree>
-    <p:extLst>
-      <p:ext uri="{BB962C8B-B14F-4D97-AF65-F5344CB8AC3E}">
-        <p14:creationId xmlns:p14="http://schemas.microsoft.com/office/powerpoint/2010/main" val="3443396952"/>
-      </p:ext>
-    </p:extLst>
-  </p:cSld>
-  <p:clrMapOvr>
-    <a:masterClrMapping/>
-  </p:clrMapOvr>
-</p:sld>
-</file>
-
-<file path=ppt/slides/slide26.xml><?xml version="1.0" encoding="utf-8"?>
-<p:sld xmlns:a="http://schemas.openxmlformats.org/drawingml/2006/main" xmlns:r="http://schemas.openxmlformats.org/officeDocument/2006/relationships" xmlns:p="http://schemas.openxmlformats.org/presentationml/2006/main">
-  <p:cSld>
-    <p:spTree>
-      <p:nvGrpSpPr>
-        <p:cNvPr id="1" name=""/>
-        <p:cNvGrpSpPr/>
-        <p:nvPr/>
-      </p:nvGrpSpPr>
-      <p:grpSpPr>
-        <a:xfrm>
-          <a:off x="0" y="0"/>
-          <a:ext cx="0" cy="0"/>
-          <a:chOff x="0" y="0"/>
-          <a:chExt cx="0" cy="0"/>
-        </a:xfrm>
-      </p:grpSpPr>
-      <p:sp>
-        <p:nvSpPr>
-          <p:cNvPr id="2" name="Title 1">
-            <a:extLst>
-              <a:ext uri="{FF2B5EF4-FFF2-40B4-BE49-F238E27FC236}">
-                <a16:creationId xmlns:a16="http://schemas.microsoft.com/office/drawing/2014/main" id="{F57B5DE4-5344-5527-869B-0C8136F8327F}"/>
-              </a:ext>
-            </a:extLst>
-          </p:cNvPr>
-          <p:cNvSpPr>
-            <a:spLocks noGrp="1"/>
-          </p:cNvSpPr>
-          <p:nvPr>
-            <p:ph type="title"/>
-          </p:nvPr>
-        </p:nvSpPr>
-        <p:spPr/>
-        <p:txBody>
-          <a:bodyPr/>
-          <a:lstStyle/>
-          <a:p>
-            <a:r>
-              <a:rPr lang="en-US" dirty="0"/>
-              <a:t>Friendly amendments</a:t>
-            </a:r>
-          </a:p>
-        </p:txBody>
-      </p:sp>
-      <p:sp>
-        <p:nvSpPr>
-          <p:cNvPr id="3" name="Content Placeholder 2">
-            <a:extLst>
-              <a:ext uri="{FF2B5EF4-FFF2-40B4-BE49-F238E27FC236}">
-                <a16:creationId xmlns:a16="http://schemas.microsoft.com/office/drawing/2014/main" id="{A328B26F-F56C-456C-BD13-B8B761D73BDF}"/>
-              </a:ext>
-            </a:extLst>
-          </p:cNvPr>
-          <p:cNvSpPr>
-            <a:spLocks noGrp="1"/>
-          </p:cNvSpPr>
-          <p:nvPr>
-            <p:ph idx="1"/>
-          </p:nvPr>
-        </p:nvSpPr>
-        <p:spPr/>
-        <p:txBody>
-          <a:bodyPr>
-            <a:normAutofit/>
-          </a:bodyPr>
-          <a:lstStyle/>
-          <a:p>
-            <a:r>
-              <a:rPr lang="en-US" dirty="0"/>
-              <a:t>No such thing</a:t>
-            </a:r>
-          </a:p>
-          <a:p>
-            <a:r>
-              <a:rPr lang="en-US" dirty="0"/>
-              <a:t>Except when there are: </a:t>
-            </a:r>
-            <a:r>
-              <a:rPr lang="en-US" sz="1800" dirty="0">
-                <a:hlinkClick r:id="rId2"/>
-              </a:rPr>
-              <a:t>https://github.com/AdamSwenson/parliamentary-procedure-explainers/blob/main/A%20friendly%20note%20unfriendly%20to%20friendly%20amendments.pdf</a:t>
-            </a:r>
-            <a:endParaRPr lang="en-US" sz="1800" dirty="0"/>
-          </a:p>
-          <a:p>
-            <a:endParaRPr lang="en-US" dirty="0"/>
-          </a:p>
-        </p:txBody>
-      </p:sp>
-    </p:spTree>
-    <p:extLst>
-      <p:ext uri="{BB962C8B-B14F-4D97-AF65-F5344CB8AC3E}">
-        <p14:creationId xmlns:p14="http://schemas.microsoft.com/office/powerpoint/2010/main" val="347005012"/>
-      </p:ext>
-    </p:extLst>
-  </p:cSld>
-  <p:clrMapOvr>
-    <a:masterClrMapping/>
-  </p:clrMapOvr>
-</p:sld>
-</file>
-
-<file path=ppt/slides/slide27.xml><?xml version="1.0" encoding="utf-8"?>
 <p:sld xmlns:a="http://schemas.openxmlformats.org/drawingml/2006/main" xmlns:r="http://schemas.openxmlformats.org/officeDocument/2006/relationships" xmlns:p="http://schemas.openxmlformats.org/presentationml/2006/main">
   <p:cSld>
     <p:bg>
@@ -27057,7 +26499,7 @@
 </p:sld>
 </file>
 
-<file path=ppt/slides/slide28.xml><?xml version="1.0" encoding="utf-8"?>
+<file path=ppt/slides/slide26.xml><?xml version="1.0" encoding="utf-8"?>
 <p:sld xmlns:a="http://schemas.openxmlformats.org/drawingml/2006/main" xmlns:r="http://schemas.openxmlformats.org/officeDocument/2006/relationships" xmlns:p="http://schemas.openxmlformats.org/presentationml/2006/main">
   <p:cSld>
     <p:spTree>
@@ -27149,7 +26591,7 @@
 </p:sld>
 </file>
 
-<file path=ppt/slides/slide29.xml><?xml version="1.0" encoding="utf-8"?>
+<file path=ppt/slides/slide27.xml><?xml version="1.0" encoding="utf-8"?>
 <p:sld xmlns:a="http://schemas.openxmlformats.org/drawingml/2006/main" xmlns:r="http://schemas.openxmlformats.org/officeDocument/2006/relationships" xmlns:p="http://schemas.openxmlformats.org/presentationml/2006/main">
   <p:cSld>
     <p:spTree>
@@ -27270,124 +26712,7 @@
 </p:sld>
 </file>
 
-<file path=ppt/slides/slide3.xml><?xml version="1.0" encoding="utf-8"?>
-<p:sld xmlns:a="http://schemas.openxmlformats.org/drawingml/2006/main" xmlns:r="http://schemas.openxmlformats.org/officeDocument/2006/relationships" xmlns:p="http://schemas.openxmlformats.org/presentationml/2006/main">
-  <p:cSld>
-    <p:spTree>
-      <p:nvGrpSpPr>
-        <p:cNvPr id="1" name=""/>
-        <p:cNvGrpSpPr/>
-        <p:nvPr/>
-      </p:nvGrpSpPr>
-      <p:grpSpPr>
-        <a:xfrm>
-          <a:off x="0" y="0"/>
-          <a:ext cx="0" cy="0"/>
-          <a:chOff x="0" y="0"/>
-          <a:chExt cx="0" cy="0"/>
-        </a:xfrm>
-      </p:grpSpPr>
-      <p:sp>
-        <p:nvSpPr>
-          <p:cNvPr id="2" name="Title 1">
-            <a:extLst>
-              <a:ext uri="{FF2B5EF4-FFF2-40B4-BE49-F238E27FC236}">
-                <a16:creationId xmlns:a16="http://schemas.microsoft.com/office/drawing/2014/main" id="{4522D26C-7A18-1E2B-2955-D11836838CD7}"/>
-              </a:ext>
-            </a:extLst>
-          </p:cNvPr>
-          <p:cNvSpPr>
-            <a:spLocks noGrp="1"/>
-          </p:cNvSpPr>
-          <p:nvPr>
-            <p:ph type="title"/>
-          </p:nvPr>
-        </p:nvSpPr>
-        <p:spPr/>
-        <p:txBody>
-          <a:bodyPr/>
-          <a:lstStyle/>
-          <a:p>
-            <a:r>
-              <a:rPr lang="en-US" dirty="0"/>
-              <a:t>Why do I care so much about </a:t>
-            </a:r>
-            <a:r>
-              <a:rPr lang="en-US" dirty="0" err="1"/>
-              <a:t>Robz</a:t>
-            </a:r>
-            <a:r>
-              <a:rPr lang="en-US" dirty="0"/>
-              <a:t>?</a:t>
-            </a:r>
-          </a:p>
-        </p:txBody>
-      </p:sp>
-      <p:sp>
-        <p:nvSpPr>
-          <p:cNvPr id="3" name="Content Placeholder 2">
-            <a:extLst>
-              <a:ext uri="{FF2B5EF4-FFF2-40B4-BE49-F238E27FC236}">
-                <a16:creationId xmlns:a16="http://schemas.microsoft.com/office/drawing/2014/main" id="{28DD5FB9-53CB-FE7F-ECD3-DE8C5A4B133E}"/>
-              </a:ext>
-            </a:extLst>
-          </p:cNvPr>
-          <p:cNvSpPr>
-            <a:spLocks noGrp="1"/>
-          </p:cNvSpPr>
-          <p:nvPr>
-            <p:ph idx="1"/>
-          </p:nvPr>
-        </p:nvSpPr>
-        <p:spPr/>
-        <p:txBody>
-          <a:bodyPr/>
-          <a:lstStyle/>
-          <a:p>
-            <a:r>
-              <a:rPr lang="en-US" dirty="0"/>
-              <a:t>Justice and fairness</a:t>
-            </a:r>
-          </a:p>
-          <a:p>
-            <a:pPr lvl="1"/>
-            <a:r>
-              <a:rPr lang="en-US" dirty="0"/>
-              <a:t>Used properly, Robert’s Rules (and parliamentary procedure generally) allows large groups of people with different views to act together on divisive topics.</a:t>
-            </a:r>
-          </a:p>
-          <a:p>
-            <a:pPr lvl="1"/>
-            <a:r>
-              <a:rPr lang="en-US" dirty="0"/>
-              <a:t>Used poorly, it is a tool for unfairness and injustice.</a:t>
-            </a:r>
-          </a:p>
-          <a:p>
-            <a:endParaRPr lang="en-US" dirty="0"/>
-          </a:p>
-          <a:p>
-            <a:r>
-              <a:rPr lang="en-US" dirty="0"/>
-              <a:t>The more folks who understand the basics, the more likely it will be used properly.</a:t>
-            </a:r>
-          </a:p>
-        </p:txBody>
-      </p:sp>
-    </p:spTree>
-    <p:extLst>
-      <p:ext uri="{BB962C8B-B14F-4D97-AF65-F5344CB8AC3E}">
-        <p14:creationId xmlns:p14="http://schemas.microsoft.com/office/powerpoint/2010/main" val="443185354"/>
-      </p:ext>
-    </p:extLst>
-  </p:cSld>
-  <p:clrMapOvr>
-    <a:masterClrMapping/>
-  </p:clrMapOvr>
-</p:sld>
-</file>
-
-<file path=ppt/slides/slide30.xml><?xml version="1.0" encoding="utf-8"?>
+<file path=ppt/slides/slide28.xml><?xml version="1.0" encoding="utf-8"?>
 <p:sld xmlns:a="http://schemas.openxmlformats.org/drawingml/2006/main" xmlns:r="http://schemas.openxmlformats.org/officeDocument/2006/relationships" xmlns:p="http://schemas.openxmlformats.org/presentationml/2006/main">
   <p:cSld>
     <p:spTree>
@@ -27519,7 +26844,7 @@
 </p:sld>
 </file>
 
-<file path=ppt/slides/slide31.xml><?xml version="1.0" encoding="utf-8"?>
+<file path=ppt/slides/slide29.xml><?xml version="1.0" encoding="utf-8"?>
 <p:sld xmlns:a="http://schemas.openxmlformats.org/drawingml/2006/main" xmlns:r="http://schemas.openxmlformats.org/officeDocument/2006/relationships" xmlns:p="http://schemas.openxmlformats.org/presentationml/2006/main">
   <p:cSld>
     <p:spTree>
@@ -27635,7 +26960,124 @@
 </p:sld>
 </file>
 
-<file path=ppt/slides/slide32.xml><?xml version="1.0" encoding="utf-8"?>
+<file path=ppt/slides/slide3.xml><?xml version="1.0" encoding="utf-8"?>
+<p:sld xmlns:a="http://schemas.openxmlformats.org/drawingml/2006/main" xmlns:r="http://schemas.openxmlformats.org/officeDocument/2006/relationships" xmlns:p="http://schemas.openxmlformats.org/presentationml/2006/main">
+  <p:cSld>
+    <p:spTree>
+      <p:nvGrpSpPr>
+        <p:cNvPr id="1" name=""/>
+        <p:cNvGrpSpPr/>
+        <p:nvPr/>
+      </p:nvGrpSpPr>
+      <p:grpSpPr>
+        <a:xfrm>
+          <a:off x="0" y="0"/>
+          <a:ext cx="0" cy="0"/>
+          <a:chOff x="0" y="0"/>
+          <a:chExt cx="0" cy="0"/>
+        </a:xfrm>
+      </p:grpSpPr>
+      <p:sp>
+        <p:nvSpPr>
+          <p:cNvPr id="2" name="Title 1">
+            <a:extLst>
+              <a:ext uri="{FF2B5EF4-FFF2-40B4-BE49-F238E27FC236}">
+                <a16:creationId xmlns:a16="http://schemas.microsoft.com/office/drawing/2014/main" id="{4522D26C-7A18-1E2B-2955-D11836838CD7}"/>
+              </a:ext>
+            </a:extLst>
+          </p:cNvPr>
+          <p:cNvSpPr>
+            <a:spLocks noGrp="1"/>
+          </p:cNvSpPr>
+          <p:nvPr>
+            <p:ph type="title"/>
+          </p:nvPr>
+        </p:nvSpPr>
+        <p:spPr/>
+        <p:txBody>
+          <a:bodyPr/>
+          <a:lstStyle/>
+          <a:p>
+            <a:r>
+              <a:rPr lang="en-US" dirty="0"/>
+              <a:t>Why do I care so much about </a:t>
+            </a:r>
+            <a:r>
+              <a:rPr lang="en-US" dirty="0" err="1"/>
+              <a:t>Robz</a:t>
+            </a:r>
+            <a:r>
+              <a:rPr lang="en-US" dirty="0"/>
+              <a:t>?</a:t>
+            </a:r>
+          </a:p>
+        </p:txBody>
+      </p:sp>
+      <p:sp>
+        <p:nvSpPr>
+          <p:cNvPr id="3" name="Content Placeholder 2">
+            <a:extLst>
+              <a:ext uri="{FF2B5EF4-FFF2-40B4-BE49-F238E27FC236}">
+                <a16:creationId xmlns:a16="http://schemas.microsoft.com/office/drawing/2014/main" id="{28DD5FB9-53CB-FE7F-ECD3-DE8C5A4B133E}"/>
+              </a:ext>
+            </a:extLst>
+          </p:cNvPr>
+          <p:cNvSpPr>
+            <a:spLocks noGrp="1"/>
+          </p:cNvSpPr>
+          <p:nvPr>
+            <p:ph idx="1"/>
+          </p:nvPr>
+        </p:nvSpPr>
+        <p:spPr/>
+        <p:txBody>
+          <a:bodyPr/>
+          <a:lstStyle/>
+          <a:p>
+            <a:r>
+              <a:rPr lang="en-US" dirty="0"/>
+              <a:t>Justice and fairness</a:t>
+            </a:r>
+          </a:p>
+          <a:p>
+            <a:pPr lvl="1"/>
+            <a:r>
+              <a:rPr lang="en-US" dirty="0"/>
+              <a:t>Used properly, Robert’s Rules (and parliamentary procedure generally) allows large groups of people with different views to act together on divisive topics.</a:t>
+            </a:r>
+          </a:p>
+          <a:p>
+            <a:pPr lvl="1"/>
+            <a:r>
+              <a:rPr lang="en-US" dirty="0"/>
+              <a:t>Used poorly, it is a tool for unfairness and injustice.</a:t>
+            </a:r>
+          </a:p>
+          <a:p>
+            <a:endParaRPr lang="en-US" dirty="0"/>
+          </a:p>
+          <a:p>
+            <a:r>
+              <a:rPr lang="en-US" dirty="0"/>
+              <a:t>The more folks who understand the basics, the more likely it will be used properly.</a:t>
+            </a:r>
+          </a:p>
+        </p:txBody>
+      </p:sp>
+    </p:spTree>
+    <p:extLst>
+      <p:ext uri="{BB962C8B-B14F-4D97-AF65-F5344CB8AC3E}">
+        <p14:creationId xmlns:p14="http://schemas.microsoft.com/office/powerpoint/2010/main" val="443185354"/>
+      </p:ext>
+    </p:extLst>
+  </p:cSld>
+  <p:clrMapOvr>
+    <a:masterClrMapping/>
+  </p:clrMapOvr>
+</p:sld>
+</file>
+
+<file path=ppt/slides/slide30.xml><?xml version="1.0" encoding="utf-8"?>
 <p:sld xmlns:a="http://schemas.openxmlformats.org/drawingml/2006/main" xmlns:r="http://schemas.openxmlformats.org/officeDocument/2006/relationships" xmlns:p="http://schemas.openxmlformats.org/presentationml/2006/main">
   <p:cSld>
     <p:bg>
@@ -27847,7 +27289,7 @@
 </p:sld>
 </file>
 
-<file path=ppt/slides/slide33.xml><?xml version="1.0" encoding="utf-8"?>
+<file path=ppt/slides/slide31.xml><?xml version="1.0" encoding="utf-8"?>
 <p:sld xmlns:a="http://schemas.openxmlformats.org/drawingml/2006/main" xmlns:r="http://schemas.openxmlformats.org/officeDocument/2006/relationships" xmlns:p="http://schemas.openxmlformats.org/presentationml/2006/main">
   <p:cSld>
     <p:spTree>
@@ -27981,7 +27423,7 @@
 </p:sld>
 </file>
 
-<file path=ppt/slides/slide34.xml><?xml version="1.0" encoding="utf-8"?>
+<file path=ppt/slides/slide32.xml><?xml version="1.0" encoding="utf-8"?>
 <p:sld xmlns:a="http://schemas.openxmlformats.org/drawingml/2006/main" xmlns:r="http://schemas.openxmlformats.org/officeDocument/2006/relationships" xmlns:p="http://schemas.openxmlformats.org/presentationml/2006/main">
   <p:cSld>
     <p:spTree>
@@ -28106,7 +27548,7 @@
                 <a:effectLst/>
                 <a:latin typeface="Helvetica Neue" panose="02000503000000020004" pitchFamily="2" charset="0"/>
               </a:rPr>
-              <a:t>n gross or without debate or amendment.” [41:34]</a:t>
+              <a:t>n gross or without debate or amendment.” [41:34; my italics]</a:t>
             </a:r>
             <a:endParaRPr lang="en-US" dirty="0"/>
           </a:p>
@@ -28125,7 +27567,7 @@
 </p:sld>
 </file>
 
-<file path=ppt/slides/slide35.xml><?xml version="1.0" encoding="utf-8"?>
+<file path=ppt/slides/slide33.xml><?xml version="1.0" encoding="utf-8"?>
 <p:sld xmlns:a="http://schemas.openxmlformats.org/drawingml/2006/main" xmlns:r="http://schemas.openxmlformats.org/officeDocument/2006/relationships" xmlns:p="http://schemas.openxmlformats.org/presentationml/2006/main">
   <p:cSld>
     <p:spTree>
@@ -28278,7 +27720,7 @@
 </p:sld>
 </file>
 
-<file path=ppt/slides/slide36.xml><?xml version="1.0" encoding="utf-8"?>
+<file path=ppt/slides/slide34.xml><?xml version="1.0" encoding="utf-8"?>
 <p:sld xmlns:a="http://schemas.openxmlformats.org/drawingml/2006/main" xmlns:r="http://schemas.openxmlformats.org/officeDocument/2006/relationships" xmlns:p="http://schemas.openxmlformats.org/presentationml/2006/main">
   <p:cSld>
     <p:spTree>
@@ -28342,28 +27784,9 @@
         <p:spPr/>
         <p:txBody>
           <a:bodyPr>
-            <a:normAutofit lnSpcReduction="10000"/>
+            <a:normAutofit fontScale="92500" lnSpcReduction="10000"/>
           </a:bodyPr>
           <a:lstStyle/>
-          <a:p>
-            <a:r>
-              <a:rPr lang="en-US" dirty="0"/>
-              <a:t>It is possible to have a meeting without an agenda</a:t>
-            </a:r>
-          </a:p>
-          <a:p>
-            <a:pPr lvl="1"/>
-            <a:r>
-              <a:rPr lang="en-US" dirty="0"/>
-              <a:t>It is not possible to have a meeting without an agenda without Adam breaking down in tears and fleeing the room</a:t>
-            </a:r>
-          </a:p>
-          <a:p>
-            <a:pPr marL="457200" lvl="1" indent="0">
-              <a:buNone/>
-            </a:pPr>
-            <a:endParaRPr lang="en-US" dirty="0"/>
-          </a:p>
           <a:p>
             <a:r>
               <a:rPr lang="en-US" dirty="0"/>
@@ -28416,6 +27839,28 @@
             </a:r>
           </a:p>
           <a:p>
+            <a:pPr marL="0" indent="0">
+              <a:buNone/>
+            </a:pPr>
+            <a:endParaRPr lang="en-US" dirty="0"/>
+          </a:p>
+          <a:p>
+            <a:r>
+              <a:rPr lang="en-US" dirty="0"/>
+              <a:t>It is possible to have a meeting without an agenda</a:t>
+            </a:r>
+          </a:p>
+          <a:p>
+            <a:pPr lvl="1"/>
+            <a:r>
+              <a:rPr lang="en-US" dirty="0"/>
+              <a:t>It is not possible to have a meeting without an agenda without Adam breaking into tears and fleeing the room</a:t>
+            </a:r>
+          </a:p>
+          <a:p>
+            <a:pPr marL="0" indent="0">
+              <a:buNone/>
+            </a:pPr>
             <a:endParaRPr lang="en-US" dirty="0"/>
           </a:p>
           <a:p>
@@ -28445,7 +27890,7 @@
 </p:sld>
 </file>
 
-<file path=ppt/slides/slide37.xml><?xml version="1.0" encoding="utf-8"?>
+<file path=ppt/slides/slide35.xml><?xml version="1.0" encoding="utf-8"?>
 <p:sld xmlns:a="http://schemas.openxmlformats.org/drawingml/2006/main" xmlns:r="http://schemas.openxmlformats.org/officeDocument/2006/relationships" xmlns:p="http://schemas.openxmlformats.org/presentationml/2006/main">
   <p:cSld>
     <p:spTree>
@@ -28554,9 +27999,19 @@
             </a:r>
           </a:p>
           <a:p>
+            <a:endParaRPr lang="en-US" dirty="0"/>
+          </a:p>
+          <a:p>
             <a:r>
               <a:rPr lang="en-US" dirty="0"/>
-              <a:t>NB, all of these are binding and can’t be changed on the fly. (Though most rules can be temporarily suspended by a 2/3 vote)</a:t>
+              <a:t>NB, all of these are binding and can’t be changed on the fly. </a:t>
+            </a:r>
+          </a:p>
+          <a:p>
+            <a:pPr lvl="1"/>
+            <a:r>
+              <a:rPr lang="en-US" dirty="0"/>
+              <a:t>Though most rules can be temporarily suspended by a 2/3 vote</a:t>
             </a:r>
           </a:p>
           <a:p>
@@ -28580,7 +28035,7 @@
 </p:sld>
 </file>
 
-<file path=ppt/slides/slide38.xml><?xml version="1.0" encoding="utf-8"?>
+<file path=ppt/slides/slide36.xml><?xml version="1.0" encoding="utf-8"?>
 <p:sld xmlns:a="http://schemas.openxmlformats.org/drawingml/2006/main" xmlns:r="http://schemas.openxmlformats.org/officeDocument/2006/relationships" xmlns:p="http://schemas.openxmlformats.org/presentationml/2006/main">
   <p:cSld>
     <p:spTree>
@@ -28687,7 +28142,7 @@
 </p:sld>
 </file>
 
-<file path=ppt/slides/slide39.xml><?xml version="1.0" encoding="utf-8"?>
+<file path=ppt/slides/slide37.xml><?xml version="1.0" encoding="utf-8"?>
 <p:sld xmlns:a="http://schemas.openxmlformats.org/drawingml/2006/main" xmlns:r="http://schemas.openxmlformats.org/officeDocument/2006/relationships" xmlns:p="http://schemas.openxmlformats.org/presentationml/2006/main" show="0">
   <p:cSld>
     <p:spTree>
@@ -28790,454 +28245,7 @@
 </p:sld>
 </file>
 
-<file path=ppt/slides/slide4.xml><?xml version="1.0" encoding="utf-8"?>
-<p:sld xmlns:a="http://schemas.openxmlformats.org/drawingml/2006/main" xmlns:r="http://schemas.openxmlformats.org/officeDocument/2006/relationships" xmlns:p="http://schemas.openxmlformats.org/presentationml/2006/main">
-  <p:cSld>
-    <p:bg>
-      <p:bgPr>
-        <a:solidFill>
-          <a:schemeClr val="bg1"/>
-        </a:solidFill>
-        <a:effectLst/>
-      </p:bgPr>
-    </p:bg>
-    <p:spTree>
-      <p:nvGrpSpPr>
-        <p:cNvPr id="1" name=""/>
-        <p:cNvGrpSpPr/>
-        <p:nvPr/>
-      </p:nvGrpSpPr>
-      <p:grpSpPr>
-        <a:xfrm>
-          <a:off x="0" y="0"/>
-          <a:ext cx="0" cy="0"/>
-          <a:chOff x="0" y="0"/>
-          <a:chExt cx="0" cy="0"/>
-        </a:xfrm>
-      </p:grpSpPr>
-      <p:sp useBgFill="1">
-        <p:nvSpPr>
-          <p:cNvPr id="11" name="Rectangle 10">
-            <a:extLst>
-              <a:ext uri="{FF2B5EF4-FFF2-40B4-BE49-F238E27FC236}">
-                <a16:creationId xmlns:a16="http://schemas.microsoft.com/office/drawing/2014/main" id="{0671A8AE-40A1-4631-A6B8-581AFF065482}"/>
-              </a:ext>
-              <a:ext uri="{C183D7F6-B498-43B3-948B-1728B52AA6E4}">
-                <adec:decorative xmlns:adec="http://schemas.microsoft.com/office/drawing/2017/decorative" val="1"/>
-              </a:ext>
-            </a:extLst>
-          </p:cNvPr>
-          <p:cNvSpPr>
-            <a:spLocks noGrp="1" noRot="1" noChangeAspect="1" noMove="1" noResize="1" noEditPoints="1" noAdjustHandles="1" noChangeArrowheads="1" noChangeShapeType="1" noTextEdit="1"/>
-          </p:cNvSpPr>
-          <p:nvPr>
-            <p:extLst>
-              <p:ext uri="{386F3935-93C4-4BCD-93E2-E3B085C9AB24}">
-                <p16:designElem xmlns:p16="http://schemas.microsoft.com/office/powerpoint/2015/main" val="1"/>
-              </p:ext>
-            </p:extLst>
-          </p:nvPr>
-        </p:nvSpPr>
-        <p:spPr>
-          <a:xfrm>
-            <a:off x="0" y="0"/>
-            <a:ext cx="12192000" cy="6858000"/>
-          </a:xfrm>
-          <a:prstGeom prst="rect">
-            <a:avLst/>
-          </a:prstGeom>
-          <a:ln>
-            <a:noFill/>
-          </a:ln>
-        </p:spPr>
-        <p:style>
-          <a:lnRef idx="2">
-            <a:schemeClr val="accent1">
-              <a:shade val="50000"/>
-            </a:schemeClr>
-          </a:lnRef>
-          <a:fillRef idx="1">
-            <a:schemeClr val="accent1"/>
-          </a:fillRef>
-          <a:effectRef idx="0">
-            <a:schemeClr val="accent1"/>
-          </a:effectRef>
-          <a:fontRef idx="minor">
-            <a:schemeClr val="lt1"/>
-          </a:fontRef>
-        </p:style>
-        <p:txBody>
-          <a:bodyPr rtlCol="0" anchor="ctr"/>
-          <a:lstStyle/>
-          <a:p>
-            <a:pPr algn="ctr"/>
-            <a:endParaRPr lang="en-US"/>
-          </a:p>
-        </p:txBody>
-      </p:sp>
-      <p:pic>
-        <p:nvPicPr>
-          <p:cNvPr id="7" name="Picture 6" descr="Hand reaching out to sun">
-            <a:extLst>
-              <a:ext uri="{FF2B5EF4-FFF2-40B4-BE49-F238E27FC236}">
-                <a16:creationId xmlns:a16="http://schemas.microsoft.com/office/drawing/2014/main" id="{90ECDAF6-F548-8D21-E300-7965E25BFCC3}"/>
-              </a:ext>
-            </a:extLst>
-          </p:cNvPr>
-          <p:cNvPicPr>
-            <a:picLocks noChangeAspect="1"/>
-          </p:cNvPicPr>
-          <p:nvPr/>
-        </p:nvPicPr>
-        <p:blipFill rotWithShape="1">
-          <a:blip r:embed="rId2"/>
-          <a:srcRect l="4194" r="11119" b="2"/>
-          <a:stretch/>
-        </p:blipFill>
-        <p:spPr>
-          <a:xfrm>
-            <a:off x="3523488" y="10"/>
-            <a:ext cx="8668512" cy="6857990"/>
-          </a:xfrm>
-          <a:prstGeom prst="rect">
-            <a:avLst/>
-          </a:prstGeom>
-        </p:spPr>
-      </p:pic>
-      <p:sp>
-        <p:nvSpPr>
-          <p:cNvPr id="13" name="Rectangle 12">
-            <a:extLst>
-              <a:ext uri="{FF2B5EF4-FFF2-40B4-BE49-F238E27FC236}">
-                <a16:creationId xmlns:a16="http://schemas.microsoft.com/office/drawing/2014/main" id="{AB58EF07-17C2-48CF-ABB0-EEF1F17CB8F0}"/>
-              </a:ext>
-              <a:ext uri="{C183D7F6-B498-43B3-948B-1728B52AA6E4}">
-                <adec:decorative xmlns:adec="http://schemas.microsoft.com/office/drawing/2017/decorative" val="1"/>
-              </a:ext>
-            </a:extLst>
-          </p:cNvPr>
-          <p:cNvSpPr>
-            <a:spLocks noGrp="1" noRot="1" noChangeAspect="1" noMove="1" noResize="1" noEditPoints="1" noAdjustHandles="1" noChangeArrowheads="1" noChangeShapeType="1" noTextEdit="1"/>
-          </p:cNvSpPr>
-          <p:nvPr>
-            <p:extLst>
-              <p:ext uri="{386F3935-93C4-4BCD-93E2-E3B085C9AB24}">
-                <p16:designElem xmlns:p16="http://schemas.microsoft.com/office/powerpoint/2015/main" val="1"/>
-              </p:ext>
-            </p:extLst>
-          </p:nvPr>
-        </p:nvSpPr>
-        <p:spPr>
-          <a:xfrm>
-            <a:off x="3" y="0"/>
-            <a:ext cx="9339206" cy="6858000"/>
-          </a:xfrm>
-          <a:prstGeom prst="rect">
-            <a:avLst/>
-          </a:prstGeom>
-          <a:gradFill>
-            <a:gsLst>
-              <a:gs pos="58000">
-                <a:schemeClr val="tx1"/>
-              </a:gs>
-              <a:gs pos="33000">
-                <a:schemeClr val="tx1">
-                  <a:alpha val="64000"/>
-                </a:schemeClr>
-              </a:gs>
-              <a:gs pos="0">
-                <a:schemeClr val="tx1">
-                  <a:alpha val="0"/>
-                </a:schemeClr>
-              </a:gs>
-              <a:gs pos="100000">
-                <a:schemeClr val="tx1"/>
-              </a:gs>
-            </a:gsLst>
-            <a:lin ang="10800000" scaled="0"/>
-          </a:gradFill>
-          <a:ln>
-            <a:noFill/>
-          </a:ln>
-        </p:spPr>
-        <p:style>
-          <a:lnRef idx="2">
-            <a:schemeClr val="accent1">
-              <a:shade val="50000"/>
-            </a:schemeClr>
-          </a:lnRef>
-          <a:fillRef idx="1">
-            <a:schemeClr val="accent1"/>
-          </a:fillRef>
-          <a:effectRef idx="0">
-            <a:schemeClr val="accent1"/>
-          </a:effectRef>
-          <a:fontRef idx="minor">
-            <a:schemeClr val="lt1"/>
-          </a:fontRef>
-        </p:style>
-        <p:txBody>
-          <a:bodyPr rtlCol="0" anchor="ctr"/>
-          <a:lstStyle/>
-          <a:p>
-            <a:pPr algn="ctr"/>
-            <a:endParaRPr lang="en-US" dirty="0"/>
-          </a:p>
-        </p:txBody>
-      </p:sp>
-      <p:sp>
-        <p:nvSpPr>
-          <p:cNvPr id="4" name="Title 3">
-            <a:extLst>
-              <a:ext uri="{FF2B5EF4-FFF2-40B4-BE49-F238E27FC236}">
-                <a16:creationId xmlns:a16="http://schemas.microsoft.com/office/drawing/2014/main" id="{97F9A256-7227-A84D-5092-74D5F295A86B}"/>
-              </a:ext>
-            </a:extLst>
-          </p:cNvPr>
-          <p:cNvSpPr>
-            <a:spLocks noGrp="1"/>
-          </p:cNvSpPr>
-          <p:nvPr>
-            <p:ph type="title"/>
-          </p:nvPr>
-        </p:nvSpPr>
-        <p:spPr>
-          <a:xfrm>
-            <a:off x="477981" y="1122363"/>
-            <a:ext cx="4023360" cy="3204134"/>
-          </a:xfrm>
-        </p:spPr>
-        <p:txBody>
-          <a:bodyPr vert="horz" lIns="91440" tIns="45720" rIns="91440" bIns="45720" rtlCol="0" anchor="b">
-            <a:normAutofit/>
-          </a:bodyPr>
-          <a:lstStyle/>
-          <a:p>
-            <a:r>
-              <a:rPr lang="en-US" sz="4800" dirty="0">
-                <a:solidFill>
-                  <a:schemeClr val="bg1"/>
-                </a:solidFill>
-              </a:rPr>
-              <a:t>Everything you need to know about Robert’s Rules</a:t>
-            </a:r>
-          </a:p>
-        </p:txBody>
-      </p:sp>
-      <p:sp>
-        <p:nvSpPr>
-          <p:cNvPr id="5" name="Text Placeholder 4">
-            <a:extLst>
-              <a:ext uri="{FF2B5EF4-FFF2-40B4-BE49-F238E27FC236}">
-                <a16:creationId xmlns:a16="http://schemas.microsoft.com/office/drawing/2014/main" id="{F9B757D4-8B67-D478-9646-BFF3CBE414C0}"/>
-              </a:ext>
-            </a:extLst>
-          </p:cNvPr>
-          <p:cNvSpPr>
-            <a:spLocks noGrp="1"/>
-          </p:cNvSpPr>
-          <p:nvPr>
-            <p:ph type="body" idx="1"/>
-          </p:nvPr>
-        </p:nvSpPr>
-        <p:spPr>
-          <a:xfrm>
-            <a:off x="477980" y="4872922"/>
-            <a:ext cx="4023359" cy="1208141"/>
-          </a:xfrm>
-        </p:spPr>
-        <p:txBody>
-          <a:bodyPr vert="horz" lIns="91440" tIns="45720" rIns="91440" bIns="45720" rtlCol="0">
-            <a:normAutofit/>
-          </a:bodyPr>
-          <a:lstStyle/>
-          <a:p>
-            <a:r>
-              <a:rPr lang="en-US" sz="2000" dirty="0">
-                <a:solidFill>
-                  <a:schemeClr val="bg1"/>
-                </a:solidFill>
-              </a:rPr>
-              <a:t>Mostly….</a:t>
-            </a:r>
-          </a:p>
-        </p:txBody>
-      </p:sp>
-      <p:sp>
-        <p:nvSpPr>
-          <p:cNvPr id="15" name="Rectangle 14">
-            <a:extLst>
-              <a:ext uri="{FF2B5EF4-FFF2-40B4-BE49-F238E27FC236}">
-                <a16:creationId xmlns:a16="http://schemas.microsoft.com/office/drawing/2014/main" id="{AF2F604E-43BE-4DC3-B983-E071523364F8}"/>
-              </a:ext>
-              <a:ext uri="{C183D7F6-B498-43B3-948B-1728B52AA6E4}">
-                <adec:decorative xmlns:adec="http://schemas.microsoft.com/office/drawing/2017/decorative" val="1"/>
-              </a:ext>
-            </a:extLst>
-          </p:cNvPr>
-          <p:cNvSpPr>
-            <a:spLocks noGrp="1" noRot="1" noChangeAspect="1" noMove="1" noResize="1" noEditPoints="1" noAdjustHandles="1" noChangeArrowheads="1" noChangeShapeType="1" noTextEdit="1"/>
-          </p:cNvSpPr>
-          <p:nvPr>
-            <p:extLst>
-              <p:ext uri="{386F3935-93C4-4BCD-93E2-E3B085C9AB24}">
-                <p16:designElem xmlns:p16="http://schemas.microsoft.com/office/powerpoint/2015/main" val="1"/>
-              </p:ext>
-            </p:extLst>
-          </p:nvPr>
-        </p:nvSpPr>
-        <p:spPr>
-          <a:xfrm rot="5400000">
-            <a:off x="759921" y="346791"/>
-            <a:ext cx="146304" cy="704088"/>
-          </a:xfrm>
-          <a:prstGeom prst="rect">
-            <a:avLst/>
-          </a:prstGeom>
-          <a:solidFill>
-            <a:schemeClr val="accent2"/>
-          </a:solidFill>
-          <a:ln>
-            <a:noFill/>
-          </a:ln>
-        </p:spPr>
-        <p:style>
-          <a:lnRef idx="2">
-            <a:schemeClr val="accent1">
-              <a:shade val="50000"/>
-            </a:schemeClr>
-          </a:lnRef>
-          <a:fillRef idx="1">
-            <a:schemeClr val="accent1"/>
-          </a:fillRef>
-          <a:effectRef idx="0">
-            <a:schemeClr val="accent1"/>
-          </a:effectRef>
-          <a:fontRef idx="minor">
-            <a:schemeClr val="lt1"/>
-          </a:fontRef>
-        </p:style>
-        <p:txBody>
-          <a:bodyPr rtlCol="0" anchor="ctr"/>
-          <a:lstStyle/>
-          <a:p>
-            <a:pPr algn="ctr"/>
-            <a:endParaRPr lang="en-US">
-              <a:solidFill>
-                <a:prstClr val="white"/>
-              </a:solidFill>
-              <a:latin typeface="Calibri" panose="020F0502020204030204"/>
-            </a:endParaRPr>
-          </a:p>
-        </p:txBody>
-      </p:sp>
-      <p:sp>
-        <p:nvSpPr>
-          <p:cNvPr id="17" name="Rectangle 16">
-            <a:extLst>
-              <a:ext uri="{FF2B5EF4-FFF2-40B4-BE49-F238E27FC236}">
-                <a16:creationId xmlns:a16="http://schemas.microsoft.com/office/drawing/2014/main" id="{08C9B587-E65E-4B52-B37C-ABEBB6E87928}"/>
-              </a:ext>
-              <a:ext uri="{C183D7F6-B498-43B3-948B-1728B52AA6E4}">
-                <adec:decorative xmlns:adec="http://schemas.microsoft.com/office/drawing/2017/decorative" val="1"/>
-              </a:ext>
-            </a:extLst>
-          </p:cNvPr>
-          <p:cNvSpPr>
-            <a:spLocks noGrp="1" noRot="1" noChangeAspect="1" noMove="1" noResize="1" noEditPoints="1" noAdjustHandles="1" noChangeArrowheads="1" noChangeShapeType="1" noTextEdit="1"/>
-          </p:cNvSpPr>
-          <p:nvPr>
-            <p:extLst>
-              <p:ext uri="{386F3935-93C4-4BCD-93E2-E3B085C9AB24}">
-                <p16:designElem xmlns:p16="http://schemas.microsoft.com/office/powerpoint/2015/main" val="1"/>
-              </p:ext>
-            </p:extLst>
-          </p:nvPr>
-        </p:nvSpPr>
-        <p:spPr>
-          <a:xfrm>
-            <a:off x="481029" y="4546920"/>
-            <a:ext cx="3977640" cy="18288"/>
-          </a:xfrm>
-          <a:prstGeom prst="rect">
-            <a:avLst/>
-          </a:prstGeom>
-          <a:solidFill>
-            <a:schemeClr val="tx1"/>
-          </a:solidFill>
-          <a:ln w="3175">
-            <a:noFill/>
-          </a:ln>
-          <a:effectLst/>
-        </p:spPr>
-        <p:style>
-          <a:lnRef idx="2">
-            <a:schemeClr val="accent1">
-              <a:shade val="50000"/>
-            </a:schemeClr>
-          </a:lnRef>
-          <a:fillRef idx="1">
-            <a:schemeClr val="accent1"/>
-          </a:fillRef>
-          <a:effectRef idx="0">
-            <a:schemeClr val="accent1"/>
-          </a:effectRef>
-          <a:fontRef idx="minor">
-            <a:schemeClr val="lt1"/>
-          </a:fontRef>
-        </p:style>
-        <p:txBody>
-          <a:bodyPr rtlCol="0" anchor="ctr"/>
-          <a:lstStyle/>
-          <a:p>
-            <a:pPr marL="0" marR="0" lvl="0" indent="0" algn="ctr" defTabSz="914400" rtl="0" eaLnBrk="1" fontAlgn="auto" latinLnBrk="0" hangingPunct="1">
-              <a:lnSpc>
-                <a:spcPct val="100000"/>
-              </a:lnSpc>
-              <a:spcBef>
-                <a:spcPts val="0"/>
-              </a:spcBef>
-              <a:spcAft>
-                <a:spcPts val="0"/>
-              </a:spcAft>
-              <a:buClrTx/>
-              <a:buSzTx/>
-              <a:buFontTx/>
-              <a:buNone/>
-              <a:tabLst/>
-              <a:defRPr/>
-            </a:pPr>
-            <a:endParaRPr kumimoji="0" lang="en-US" sz="1800" b="0" i="0" u="none" strike="noStrike" kern="1200" cap="none" spc="0" normalizeH="0" baseline="0" noProof="0">
-              <a:ln>
-                <a:noFill/>
-              </a:ln>
-              <a:solidFill>
-                <a:prstClr val="white"/>
-              </a:solidFill>
-              <a:effectLst/>
-              <a:uLnTx/>
-              <a:uFillTx/>
-              <a:latin typeface="Calibri" panose="020F0502020204030204"/>
-              <a:ea typeface="+mn-ea"/>
-              <a:cs typeface="+mn-cs"/>
-            </a:endParaRPr>
-          </a:p>
-        </p:txBody>
-      </p:sp>
-    </p:spTree>
-    <p:extLst>
-      <p:ext uri="{BB962C8B-B14F-4D97-AF65-F5344CB8AC3E}">
-        <p14:creationId xmlns:p14="http://schemas.microsoft.com/office/powerpoint/2010/main" val="4129484396"/>
-      </p:ext>
-    </p:extLst>
-  </p:cSld>
-  <p:clrMapOvr>
-    <a:masterClrMapping/>
-  </p:clrMapOvr>
-</p:sld>
-</file>
-
-<file path=ppt/slides/slide40.xml><?xml version="1.0" encoding="utf-8"?>
+<file path=ppt/slides/slide38.xml><?xml version="1.0" encoding="utf-8"?>
 <p:sld xmlns:a="http://schemas.openxmlformats.org/drawingml/2006/main" xmlns:r="http://schemas.openxmlformats.org/officeDocument/2006/relationships" xmlns:p="http://schemas.openxmlformats.org/presentationml/2006/main">
   <p:cSld>
     <p:bg>
@@ -36008,7 +35016,7 @@
 </p:sld>
 </file>
 
-<file path=ppt/slides/slide41.xml><?xml version="1.0" encoding="utf-8"?>
+<file path=ppt/slides/slide39.xml><?xml version="1.0" encoding="utf-8"?>
 <p:sld xmlns:a="http://schemas.openxmlformats.org/drawingml/2006/main" xmlns:r="http://schemas.openxmlformats.org/officeDocument/2006/relationships" xmlns:p="http://schemas.openxmlformats.org/presentationml/2006/main">
   <p:cSld>
     <p:spTree>
@@ -36207,6 +35215,453 @@
     <p:extLst>
       <p:ext uri="{BB962C8B-B14F-4D97-AF65-F5344CB8AC3E}">
         <p14:creationId xmlns:p14="http://schemas.microsoft.com/office/powerpoint/2010/main" val="990795625"/>
+      </p:ext>
+    </p:extLst>
+  </p:cSld>
+  <p:clrMapOvr>
+    <a:masterClrMapping/>
+  </p:clrMapOvr>
+</p:sld>
+</file>
+
+<file path=ppt/slides/slide4.xml><?xml version="1.0" encoding="utf-8"?>
+<p:sld xmlns:a="http://schemas.openxmlformats.org/drawingml/2006/main" xmlns:r="http://schemas.openxmlformats.org/officeDocument/2006/relationships" xmlns:p="http://schemas.openxmlformats.org/presentationml/2006/main">
+  <p:cSld>
+    <p:bg>
+      <p:bgPr>
+        <a:solidFill>
+          <a:schemeClr val="bg1"/>
+        </a:solidFill>
+        <a:effectLst/>
+      </p:bgPr>
+    </p:bg>
+    <p:spTree>
+      <p:nvGrpSpPr>
+        <p:cNvPr id="1" name=""/>
+        <p:cNvGrpSpPr/>
+        <p:nvPr/>
+      </p:nvGrpSpPr>
+      <p:grpSpPr>
+        <a:xfrm>
+          <a:off x="0" y="0"/>
+          <a:ext cx="0" cy="0"/>
+          <a:chOff x="0" y="0"/>
+          <a:chExt cx="0" cy="0"/>
+        </a:xfrm>
+      </p:grpSpPr>
+      <p:sp useBgFill="1">
+        <p:nvSpPr>
+          <p:cNvPr id="11" name="Rectangle 10">
+            <a:extLst>
+              <a:ext uri="{FF2B5EF4-FFF2-40B4-BE49-F238E27FC236}">
+                <a16:creationId xmlns:a16="http://schemas.microsoft.com/office/drawing/2014/main" id="{0671A8AE-40A1-4631-A6B8-581AFF065482}"/>
+              </a:ext>
+              <a:ext uri="{C183D7F6-B498-43B3-948B-1728B52AA6E4}">
+                <adec:decorative xmlns:adec="http://schemas.microsoft.com/office/drawing/2017/decorative" val="1"/>
+              </a:ext>
+            </a:extLst>
+          </p:cNvPr>
+          <p:cNvSpPr>
+            <a:spLocks noGrp="1" noRot="1" noChangeAspect="1" noMove="1" noResize="1" noEditPoints="1" noAdjustHandles="1" noChangeArrowheads="1" noChangeShapeType="1" noTextEdit="1"/>
+          </p:cNvSpPr>
+          <p:nvPr>
+            <p:extLst>
+              <p:ext uri="{386F3935-93C4-4BCD-93E2-E3B085C9AB24}">
+                <p16:designElem xmlns:p16="http://schemas.microsoft.com/office/powerpoint/2015/main" val="1"/>
+              </p:ext>
+            </p:extLst>
+          </p:nvPr>
+        </p:nvSpPr>
+        <p:spPr>
+          <a:xfrm>
+            <a:off x="0" y="0"/>
+            <a:ext cx="12192000" cy="6858000"/>
+          </a:xfrm>
+          <a:prstGeom prst="rect">
+            <a:avLst/>
+          </a:prstGeom>
+          <a:ln>
+            <a:noFill/>
+          </a:ln>
+        </p:spPr>
+        <p:style>
+          <a:lnRef idx="2">
+            <a:schemeClr val="accent1">
+              <a:shade val="50000"/>
+            </a:schemeClr>
+          </a:lnRef>
+          <a:fillRef idx="1">
+            <a:schemeClr val="accent1"/>
+          </a:fillRef>
+          <a:effectRef idx="0">
+            <a:schemeClr val="accent1"/>
+          </a:effectRef>
+          <a:fontRef idx="minor">
+            <a:schemeClr val="lt1"/>
+          </a:fontRef>
+        </p:style>
+        <p:txBody>
+          <a:bodyPr rtlCol="0" anchor="ctr"/>
+          <a:lstStyle/>
+          <a:p>
+            <a:pPr algn="ctr"/>
+            <a:endParaRPr lang="en-US"/>
+          </a:p>
+        </p:txBody>
+      </p:sp>
+      <p:pic>
+        <p:nvPicPr>
+          <p:cNvPr id="7" name="Picture 6" descr="Hand reaching out to sun">
+            <a:extLst>
+              <a:ext uri="{FF2B5EF4-FFF2-40B4-BE49-F238E27FC236}">
+                <a16:creationId xmlns:a16="http://schemas.microsoft.com/office/drawing/2014/main" id="{90ECDAF6-F548-8D21-E300-7965E25BFCC3}"/>
+              </a:ext>
+            </a:extLst>
+          </p:cNvPr>
+          <p:cNvPicPr>
+            <a:picLocks noChangeAspect="1"/>
+          </p:cNvPicPr>
+          <p:nvPr/>
+        </p:nvPicPr>
+        <p:blipFill rotWithShape="1">
+          <a:blip r:embed="rId2"/>
+          <a:srcRect l="4194" r="11119" b="2"/>
+          <a:stretch/>
+        </p:blipFill>
+        <p:spPr>
+          <a:xfrm>
+            <a:off x="3523488" y="10"/>
+            <a:ext cx="8668512" cy="6857990"/>
+          </a:xfrm>
+          <a:prstGeom prst="rect">
+            <a:avLst/>
+          </a:prstGeom>
+        </p:spPr>
+      </p:pic>
+      <p:sp>
+        <p:nvSpPr>
+          <p:cNvPr id="13" name="Rectangle 12">
+            <a:extLst>
+              <a:ext uri="{FF2B5EF4-FFF2-40B4-BE49-F238E27FC236}">
+                <a16:creationId xmlns:a16="http://schemas.microsoft.com/office/drawing/2014/main" id="{AB58EF07-17C2-48CF-ABB0-EEF1F17CB8F0}"/>
+              </a:ext>
+              <a:ext uri="{C183D7F6-B498-43B3-948B-1728B52AA6E4}">
+                <adec:decorative xmlns:adec="http://schemas.microsoft.com/office/drawing/2017/decorative" val="1"/>
+              </a:ext>
+            </a:extLst>
+          </p:cNvPr>
+          <p:cNvSpPr>
+            <a:spLocks noGrp="1" noRot="1" noChangeAspect="1" noMove="1" noResize="1" noEditPoints="1" noAdjustHandles="1" noChangeArrowheads="1" noChangeShapeType="1" noTextEdit="1"/>
+          </p:cNvSpPr>
+          <p:nvPr>
+            <p:extLst>
+              <p:ext uri="{386F3935-93C4-4BCD-93E2-E3B085C9AB24}">
+                <p16:designElem xmlns:p16="http://schemas.microsoft.com/office/powerpoint/2015/main" val="1"/>
+              </p:ext>
+            </p:extLst>
+          </p:nvPr>
+        </p:nvSpPr>
+        <p:spPr>
+          <a:xfrm>
+            <a:off x="3" y="0"/>
+            <a:ext cx="9339206" cy="6858000"/>
+          </a:xfrm>
+          <a:prstGeom prst="rect">
+            <a:avLst/>
+          </a:prstGeom>
+          <a:gradFill>
+            <a:gsLst>
+              <a:gs pos="58000">
+                <a:schemeClr val="tx1"/>
+              </a:gs>
+              <a:gs pos="33000">
+                <a:schemeClr val="tx1">
+                  <a:alpha val="64000"/>
+                </a:schemeClr>
+              </a:gs>
+              <a:gs pos="0">
+                <a:schemeClr val="tx1">
+                  <a:alpha val="0"/>
+                </a:schemeClr>
+              </a:gs>
+              <a:gs pos="100000">
+                <a:schemeClr val="tx1"/>
+              </a:gs>
+            </a:gsLst>
+            <a:lin ang="10800000" scaled="0"/>
+          </a:gradFill>
+          <a:ln>
+            <a:noFill/>
+          </a:ln>
+        </p:spPr>
+        <p:style>
+          <a:lnRef idx="2">
+            <a:schemeClr val="accent1">
+              <a:shade val="50000"/>
+            </a:schemeClr>
+          </a:lnRef>
+          <a:fillRef idx="1">
+            <a:schemeClr val="accent1"/>
+          </a:fillRef>
+          <a:effectRef idx="0">
+            <a:schemeClr val="accent1"/>
+          </a:effectRef>
+          <a:fontRef idx="minor">
+            <a:schemeClr val="lt1"/>
+          </a:fontRef>
+        </p:style>
+        <p:txBody>
+          <a:bodyPr rtlCol="0" anchor="ctr"/>
+          <a:lstStyle/>
+          <a:p>
+            <a:pPr algn="ctr"/>
+            <a:endParaRPr lang="en-US" dirty="0"/>
+          </a:p>
+        </p:txBody>
+      </p:sp>
+      <p:sp>
+        <p:nvSpPr>
+          <p:cNvPr id="4" name="Title 3">
+            <a:extLst>
+              <a:ext uri="{FF2B5EF4-FFF2-40B4-BE49-F238E27FC236}">
+                <a16:creationId xmlns:a16="http://schemas.microsoft.com/office/drawing/2014/main" id="{97F9A256-7227-A84D-5092-74D5F295A86B}"/>
+              </a:ext>
+            </a:extLst>
+          </p:cNvPr>
+          <p:cNvSpPr>
+            <a:spLocks noGrp="1"/>
+          </p:cNvSpPr>
+          <p:nvPr>
+            <p:ph type="title"/>
+          </p:nvPr>
+        </p:nvSpPr>
+        <p:spPr>
+          <a:xfrm>
+            <a:off x="477981" y="1122363"/>
+            <a:ext cx="4023360" cy="3204134"/>
+          </a:xfrm>
+        </p:spPr>
+        <p:txBody>
+          <a:bodyPr vert="horz" lIns="91440" tIns="45720" rIns="91440" bIns="45720" rtlCol="0" anchor="b">
+            <a:normAutofit/>
+          </a:bodyPr>
+          <a:lstStyle/>
+          <a:p>
+            <a:r>
+              <a:rPr lang="en-US" sz="4800" dirty="0">
+                <a:solidFill>
+                  <a:schemeClr val="bg1"/>
+                </a:solidFill>
+              </a:rPr>
+              <a:t>Everything you need to know about Robert’s Rules</a:t>
+            </a:r>
+          </a:p>
+        </p:txBody>
+      </p:sp>
+      <p:sp>
+        <p:nvSpPr>
+          <p:cNvPr id="5" name="Text Placeholder 4">
+            <a:extLst>
+              <a:ext uri="{FF2B5EF4-FFF2-40B4-BE49-F238E27FC236}">
+                <a16:creationId xmlns:a16="http://schemas.microsoft.com/office/drawing/2014/main" id="{F9B757D4-8B67-D478-9646-BFF3CBE414C0}"/>
+              </a:ext>
+            </a:extLst>
+          </p:cNvPr>
+          <p:cNvSpPr>
+            <a:spLocks noGrp="1"/>
+          </p:cNvSpPr>
+          <p:nvPr>
+            <p:ph type="body" idx="1"/>
+          </p:nvPr>
+        </p:nvSpPr>
+        <p:spPr>
+          <a:xfrm>
+            <a:off x="477980" y="4872922"/>
+            <a:ext cx="4023359" cy="1208141"/>
+          </a:xfrm>
+        </p:spPr>
+        <p:txBody>
+          <a:bodyPr vert="horz" lIns="91440" tIns="45720" rIns="91440" bIns="45720" rtlCol="0">
+            <a:normAutofit/>
+          </a:bodyPr>
+          <a:lstStyle/>
+          <a:p>
+            <a:r>
+              <a:rPr lang="en-US" sz="2000" dirty="0">
+                <a:solidFill>
+                  <a:schemeClr val="bg1"/>
+                </a:solidFill>
+              </a:rPr>
+              <a:t>Mostly….</a:t>
+            </a:r>
+          </a:p>
+        </p:txBody>
+      </p:sp>
+      <p:sp>
+        <p:nvSpPr>
+          <p:cNvPr id="15" name="Rectangle 14">
+            <a:extLst>
+              <a:ext uri="{FF2B5EF4-FFF2-40B4-BE49-F238E27FC236}">
+                <a16:creationId xmlns:a16="http://schemas.microsoft.com/office/drawing/2014/main" id="{AF2F604E-43BE-4DC3-B983-E071523364F8}"/>
+              </a:ext>
+              <a:ext uri="{C183D7F6-B498-43B3-948B-1728B52AA6E4}">
+                <adec:decorative xmlns:adec="http://schemas.microsoft.com/office/drawing/2017/decorative" val="1"/>
+              </a:ext>
+            </a:extLst>
+          </p:cNvPr>
+          <p:cNvSpPr>
+            <a:spLocks noGrp="1" noRot="1" noChangeAspect="1" noMove="1" noResize="1" noEditPoints="1" noAdjustHandles="1" noChangeArrowheads="1" noChangeShapeType="1" noTextEdit="1"/>
+          </p:cNvSpPr>
+          <p:nvPr>
+            <p:extLst>
+              <p:ext uri="{386F3935-93C4-4BCD-93E2-E3B085C9AB24}">
+                <p16:designElem xmlns:p16="http://schemas.microsoft.com/office/powerpoint/2015/main" val="1"/>
+              </p:ext>
+            </p:extLst>
+          </p:nvPr>
+        </p:nvSpPr>
+        <p:spPr>
+          <a:xfrm rot="5400000">
+            <a:off x="759921" y="346791"/>
+            <a:ext cx="146304" cy="704088"/>
+          </a:xfrm>
+          <a:prstGeom prst="rect">
+            <a:avLst/>
+          </a:prstGeom>
+          <a:solidFill>
+            <a:schemeClr val="accent2"/>
+          </a:solidFill>
+          <a:ln>
+            <a:noFill/>
+          </a:ln>
+        </p:spPr>
+        <p:style>
+          <a:lnRef idx="2">
+            <a:schemeClr val="accent1">
+              <a:shade val="50000"/>
+            </a:schemeClr>
+          </a:lnRef>
+          <a:fillRef idx="1">
+            <a:schemeClr val="accent1"/>
+          </a:fillRef>
+          <a:effectRef idx="0">
+            <a:schemeClr val="accent1"/>
+          </a:effectRef>
+          <a:fontRef idx="minor">
+            <a:schemeClr val="lt1"/>
+          </a:fontRef>
+        </p:style>
+        <p:txBody>
+          <a:bodyPr rtlCol="0" anchor="ctr"/>
+          <a:lstStyle/>
+          <a:p>
+            <a:pPr algn="ctr"/>
+            <a:endParaRPr lang="en-US">
+              <a:solidFill>
+                <a:prstClr val="white"/>
+              </a:solidFill>
+              <a:latin typeface="Calibri" panose="020F0502020204030204"/>
+            </a:endParaRPr>
+          </a:p>
+        </p:txBody>
+      </p:sp>
+      <p:sp>
+        <p:nvSpPr>
+          <p:cNvPr id="17" name="Rectangle 16">
+            <a:extLst>
+              <a:ext uri="{FF2B5EF4-FFF2-40B4-BE49-F238E27FC236}">
+                <a16:creationId xmlns:a16="http://schemas.microsoft.com/office/drawing/2014/main" id="{08C9B587-E65E-4B52-B37C-ABEBB6E87928}"/>
+              </a:ext>
+              <a:ext uri="{C183D7F6-B498-43B3-948B-1728B52AA6E4}">
+                <adec:decorative xmlns:adec="http://schemas.microsoft.com/office/drawing/2017/decorative" val="1"/>
+              </a:ext>
+            </a:extLst>
+          </p:cNvPr>
+          <p:cNvSpPr>
+            <a:spLocks noGrp="1" noRot="1" noChangeAspect="1" noMove="1" noResize="1" noEditPoints="1" noAdjustHandles="1" noChangeArrowheads="1" noChangeShapeType="1" noTextEdit="1"/>
+          </p:cNvSpPr>
+          <p:nvPr>
+            <p:extLst>
+              <p:ext uri="{386F3935-93C4-4BCD-93E2-E3B085C9AB24}">
+                <p16:designElem xmlns:p16="http://schemas.microsoft.com/office/powerpoint/2015/main" val="1"/>
+              </p:ext>
+            </p:extLst>
+          </p:nvPr>
+        </p:nvSpPr>
+        <p:spPr>
+          <a:xfrm>
+            <a:off x="481029" y="4546920"/>
+            <a:ext cx="3977640" cy="18288"/>
+          </a:xfrm>
+          <a:prstGeom prst="rect">
+            <a:avLst/>
+          </a:prstGeom>
+          <a:solidFill>
+            <a:schemeClr val="tx1"/>
+          </a:solidFill>
+          <a:ln w="3175">
+            <a:noFill/>
+          </a:ln>
+          <a:effectLst/>
+        </p:spPr>
+        <p:style>
+          <a:lnRef idx="2">
+            <a:schemeClr val="accent1">
+              <a:shade val="50000"/>
+            </a:schemeClr>
+          </a:lnRef>
+          <a:fillRef idx="1">
+            <a:schemeClr val="accent1"/>
+          </a:fillRef>
+          <a:effectRef idx="0">
+            <a:schemeClr val="accent1"/>
+          </a:effectRef>
+          <a:fontRef idx="minor">
+            <a:schemeClr val="lt1"/>
+          </a:fontRef>
+        </p:style>
+        <p:txBody>
+          <a:bodyPr rtlCol="0" anchor="ctr"/>
+          <a:lstStyle/>
+          <a:p>
+            <a:pPr marL="0" marR="0" lvl="0" indent="0" algn="ctr" defTabSz="914400" rtl="0" eaLnBrk="1" fontAlgn="auto" latinLnBrk="0" hangingPunct="1">
+              <a:lnSpc>
+                <a:spcPct val="100000"/>
+              </a:lnSpc>
+              <a:spcBef>
+                <a:spcPts val="0"/>
+              </a:spcBef>
+              <a:spcAft>
+                <a:spcPts val="0"/>
+              </a:spcAft>
+              <a:buClrTx/>
+              <a:buSzTx/>
+              <a:buFontTx/>
+              <a:buNone/>
+              <a:tabLst/>
+              <a:defRPr/>
+            </a:pPr>
+            <a:endParaRPr kumimoji="0" lang="en-US" sz="1800" b="0" i="0" u="none" strike="noStrike" kern="1200" cap="none" spc="0" normalizeH="0" baseline="0" noProof="0">
+              <a:ln>
+                <a:noFill/>
+              </a:ln>
+              <a:solidFill>
+                <a:prstClr val="white"/>
+              </a:solidFill>
+              <a:effectLst/>
+              <a:uLnTx/>
+              <a:uFillTx/>
+              <a:latin typeface="Calibri" panose="020F0502020204030204"/>
+              <a:ea typeface="+mn-ea"/>
+              <a:cs typeface="+mn-cs"/>
+            </a:endParaRPr>
+          </a:p>
+        </p:txBody>
+      </p:sp>
+    </p:spTree>
+    <p:extLst>
+      <p:ext uri="{BB962C8B-B14F-4D97-AF65-F5344CB8AC3E}">
+        <p14:creationId xmlns:p14="http://schemas.microsoft.com/office/powerpoint/2010/main" val="4129484396"/>
       </p:ext>
     </p:extLst>
   </p:cSld>
@@ -37423,6 +36878,14 @@
 <file path=ppt/slides/slide9.xml><?xml version="1.0" encoding="utf-8"?>
 <p:sld xmlns:a="http://schemas.openxmlformats.org/drawingml/2006/main" xmlns:r="http://schemas.openxmlformats.org/officeDocument/2006/relationships" xmlns:p="http://schemas.openxmlformats.org/presentationml/2006/main">
   <p:cSld>
+    <p:bg>
+      <p:bgPr>
+        <a:solidFill>
+          <a:schemeClr val="bg1"/>
+        </a:solidFill>
+        <a:effectLst/>
+      </p:bgPr>
+    </p:bg>
     <p:spTree>
       <p:nvGrpSpPr>
         <p:cNvPr id="1" name=""/>
@@ -37437,12 +36900,182 @@
           <a:chExt cx="0" cy="0"/>
         </a:xfrm>
       </p:grpSpPr>
+      <p:sp useBgFill="1">
+        <p:nvSpPr>
+          <p:cNvPr id="10" name="Rectangle 9">
+            <a:extLst>
+              <a:ext uri="{FF2B5EF4-FFF2-40B4-BE49-F238E27FC236}">
+                <a16:creationId xmlns:a16="http://schemas.microsoft.com/office/drawing/2014/main" id="{0671A8AE-40A1-4631-A6B8-581AFF065482}"/>
+              </a:ext>
+              <a:ext uri="{C183D7F6-B498-43B3-948B-1728B52AA6E4}">
+                <adec:decorative xmlns:adec="http://schemas.microsoft.com/office/drawing/2017/decorative" val="1"/>
+              </a:ext>
+            </a:extLst>
+          </p:cNvPr>
+          <p:cNvSpPr>
+            <a:spLocks noGrp="1" noRot="1" noChangeAspect="1" noMove="1" noResize="1" noEditPoints="1" noAdjustHandles="1" noChangeArrowheads="1" noChangeShapeType="1" noTextEdit="1"/>
+          </p:cNvSpPr>
+          <p:nvPr>
+            <p:extLst>
+              <p:ext uri="{386F3935-93C4-4BCD-93E2-E3B085C9AB24}">
+                <p16:designElem xmlns:p16="http://schemas.microsoft.com/office/powerpoint/2015/main" val="1"/>
+              </p:ext>
+            </p:extLst>
+          </p:nvPr>
+        </p:nvSpPr>
+        <p:spPr>
+          <a:xfrm>
+            <a:off x="0" y="0"/>
+            <a:ext cx="12192000" cy="6858000"/>
+          </a:xfrm>
+          <a:prstGeom prst="rect">
+            <a:avLst/>
+          </a:prstGeom>
+          <a:ln>
+            <a:noFill/>
+          </a:ln>
+        </p:spPr>
+        <p:style>
+          <a:lnRef idx="2">
+            <a:schemeClr val="accent1">
+              <a:shade val="50000"/>
+            </a:schemeClr>
+          </a:lnRef>
+          <a:fillRef idx="1">
+            <a:schemeClr val="accent1"/>
+          </a:fillRef>
+          <a:effectRef idx="0">
+            <a:schemeClr val="accent1"/>
+          </a:effectRef>
+          <a:fontRef idx="minor">
+            <a:schemeClr val="lt1"/>
+          </a:fontRef>
+        </p:style>
+        <p:txBody>
+          <a:bodyPr rtlCol="0" anchor="ctr"/>
+          <a:lstStyle/>
+          <a:p>
+            <a:pPr algn="ctr"/>
+            <a:endParaRPr lang="en-US"/>
+          </a:p>
+        </p:txBody>
+      </p:sp>
+      <p:pic>
+        <p:nvPicPr>
+          <p:cNvPr id="6" name="Picture 5" descr="A metal dumbell">
+            <a:extLst>
+              <a:ext uri="{FF2B5EF4-FFF2-40B4-BE49-F238E27FC236}">
+                <a16:creationId xmlns:a16="http://schemas.microsoft.com/office/drawing/2014/main" id="{CE55820C-9789-3E42-22C2-441916543004}"/>
+              </a:ext>
+            </a:extLst>
+          </p:cNvPr>
+          <p:cNvPicPr>
+            <a:picLocks noChangeAspect="1"/>
+          </p:cNvPicPr>
+          <p:nvPr/>
+        </p:nvPicPr>
+        <p:blipFill rotWithShape="1">
+          <a:blip r:embed="rId2"/>
+          <a:srcRect t="4795" r="-1" b="14475"/>
+          <a:stretch/>
+        </p:blipFill>
+        <p:spPr>
+          <a:xfrm>
+            <a:off x="3523488" y="10"/>
+            <a:ext cx="8668512" cy="6857990"/>
+          </a:xfrm>
+          <a:prstGeom prst="rect">
+            <a:avLst/>
+          </a:prstGeom>
+        </p:spPr>
+      </p:pic>
+      <p:sp>
+        <p:nvSpPr>
+          <p:cNvPr id="12" name="Rectangle 11">
+            <a:extLst>
+              <a:ext uri="{FF2B5EF4-FFF2-40B4-BE49-F238E27FC236}">
+                <a16:creationId xmlns:a16="http://schemas.microsoft.com/office/drawing/2014/main" id="{AB58EF07-17C2-48CF-ABB0-EEF1F17CB8F0}"/>
+              </a:ext>
+              <a:ext uri="{C183D7F6-B498-43B3-948B-1728B52AA6E4}">
+                <adec:decorative xmlns:adec="http://schemas.microsoft.com/office/drawing/2017/decorative" val="1"/>
+              </a:ext>
+            </a:extLst>
+          </p:cNvPr>
+          <p:cNvSpPr>
+            <a:spLocks noGrp="1" noRot="1" noChangeAspect="1" noMove="1" noResize="1" noEditPoints="1" noAdjustHandles="1" noChangeArrowheads="1" noChangeShapeType="1" noTextEdit="1"/>
+          </p:cNvSpPr>
+          <p:nvPr>
+            <p:extLst>
+              <p:ext uri="{386F3935-93C4-4BCD-93E2-E3B085C9AB24}">
+                <p16:designElem xmlns:p16="http://schemas.microsoft.com/office/powerpoint/2015/main" val="1"/>
+              </p:ext>
+            </p:extLst>
+          </p:nvPr>
+        </p:nvSpPr>
+        <p:spPr>
+          <a:xfrm>
+            <a:off x="3" y="0"/>
+            <a:ext cx="9339206" cy="6858000"/>
+          </a:xfrm>
+          <a:prstGeom prst="rect">
+            <a:avLst/>
+          </a:prstGeom>
+          <a:gradFill>
+            <a:gsLst>
+              <a:gs pos="58000">
+                <a:schemeClr val="tx1"/>
+              </a:gs>
+              <a:gs pos="33000">
+                <a:schemeClr val="tx1">
+                  <a:alpha val="64000"/>
+                </a:schemeClr>
+              </a:gs>
+              <a:gs pos="0">
+                <a:schemeClr val="tx1">
+                  <a:alpha val="0"/>
+                </a:schemeClr>
+              </a:gs>
+              <a:gs pos="100000">
+                <a:schemeClr val="tx1"/>
+              </a:gs>
+            </a:gsLst>
+            <a:lin ang="10800000" scaled="0"/>
+          </a:gradFill>
+          <a:ln>
+            <a:noFill/>
+          </a:ln>
+        </p:spPr>
+        <p:style>
+          <a:lnRef idx="2">
+            <a:schemeClr val="accent1">
+              <a:shade val="50000"/>
+            </a:schemeClr>
+          </a:lnRef>
+          <a:fillRef idx="1">
+            <a:schemeClr val="accent1"/>
+          </a:fillRef>
+          <a:effectRef idx="0">
+            <a:schemeClr val="accent1"/>
+          </a:effectRef>
+          <a:fontRef idx="minor">
+            <a:schemeClr val="lt1"/>
+          </a:fontRef>
+        </p:style>
+        <p:txBody>
+          <a:bodyPr rtlCol="0" anchor="ctr"/>
+          <a:lstStyle/>
+          <a:p>
+            <a:pPr algn="ctr"/>
+            <a:endParaRPr lang="en-US" dirty="0"/>
+          </a:p>
+        </p:txBody>
+      </p:sp>
       <p:sp>
         <p:nvSpPr>
           <p:cNvPr id="2" name="Title 1">
             <a:extLst>
               <a:ext uri="{FF2B5EF4-FFF2-40B4-BE49-F238E27FC236}">
-                <a16:creationId xmlns:a16="http://schemas.microsoft.com/office/drawing/2014/main" id="{9B70C70D-E44B-CB3E-A19B-CCD1B5B8C5A7}"/>
+                <a16:creationId xmlns:a16="http://schemas.microsoft.com/office/drawing/2014/main" id="{5987BC5B-9780-B307-6C28-2C3A80ECD586}"/>
               </a:ext>
             </a:extLst>
           </p:cNvPr>
@@ -37453,24 +37086,35 @@
             <p:ph type="title"/>
           </p:nvPr>
         </p:nvSpPr>
-        <p:spPr/>
+        <p:spPr>
+          <a:xfrm>
+            <a:off x="477981" y="1122363"/>
+            <a:ext cx="4023360" cy="3204134"/>
+          </a:xfrm>
+        </p:spPr>
         <p:txBody>
-          <a:bodyPr/>
+          <a:bodyPr vert="horz" lIns="91440" tIns="45720" rIns="91440" bIns="45720" rtlCol="0" anchor="b">
+            <a:normAutofit/>
+          </a:bodyPr>
           <a:lstStyle/>
           <a:p>
             <a:r>
-              <a:rPr lang="en-US" dirty="0"/>
-              <a:t>Purpose of the rules</a:t>
+              <a:rPr lang="en-US" sz="4800" dirty="0">
+                <a:solidFill>
+                  <a:schemeClr val="bg1"/>
+                </a:solidFill>
+              </a:rPr>
+              <a:t>Mechanics of action</a:t>
             </a:r>
           </a:p>
         </p:txBody>
       </p:sp>
       <p:sp>
         <p:nvSpPr>
-          <p:cNvPr id="3" name="Content Placeholder 2">
+          <p:cNvPr id="4" name="Text Placeholder 3">
             <a:extLst>
               <a:ext uri="{FF2B5EF4-FFF2-40B4-BE49-F238E27FC236}">
-                <a16:creationId xmlns:a16="http://schemas.microsoft.com/office/drawing/2014/main" id="{50FD5AE8-FC59-0896-CFC9-5A2F29E1CEFB}"/>
+                <a16:creationId xmlns:a16="http://schemas.microsoft.com/office/drawing/2014/main" id="{C63949E0-E563-9E8A-6047-81DF544B1EBF}"/>
               </a:ext>
             </a:extLst>
           </p:cNvPr>
@@ -37478,42 +37122,194 @@
             <a:spLocks noGrp="1"/>
           </p:cNvSpPr>
           <p:nvPr>
-            <p:ph idx="1"/>
+            <p:ph type="body" idx="1"/>
           </p:nvPr>
         </p:nvSpPr>
-        <p:spPr/>
+        <p:spPr>
+          <a:xfrm>
+            <a:off x="477980" y="4872922"/>
+            <a:ext cx="4023359" cy="1208141"/>
+          </a:xfrm>
+        </p:spPr>
         <p:txBody>
-          <a:bodyPr/>
+          <a:bodyPr vert="horz" lIns="91440" tIns="45720" rIns="91440" bIns="45720" rtlCol="0">
+            <a:normAutofit/>
+          </a:bodyPr>
           <a:lstStyle/>
           <a:p>
-            <a:r>
-              <a:rPr lang="en-US" dirty="0" err="1"/>
-              <a:t>Goldthwait's</a:t>
-            </a:r>
-            <a:r>
-              <a:rPr lang="en-US" dirty="0"/>
-              <a:t> principle : The Senate must be able to act as it chooses; the rules are never there to get in the way.</a:t>
-            </a:r>
+            <a:endParaRPr lang="en-US" sz="2000">
+              <a:solidFill>
+                <a:schemeClr val="bg1"/>
+              </a:solidFill>
+            </a:endParaRPr>
           </a:p>
+        </p:txBody>
+      </p:sp>
+      <p:sp>
+        <p:nvSpPr>
+          <p:cNvPr id="14" name="Rectangle 13">
+            <a:extLst>
+              <a:ext uri="{FF2B5EF4-FFF2-40B4-BE49-F238E27FC236}">
+                <a16:creationId xmlns:a16="http://schemas.microsoft.com/office/drawing/2014/main" id="{AF2F604E-43BE-4DC3-B983-E071523364F8}"/>
+              </a:ext>
+              <a:ext uri="{C183D7F6-B498-43B3-948B-1728B52AA6E4}">
+                <adec:decorative xmlns:adec="http://schemas.microsoft.com/office/drawing/2017/decorative" val="1"/>
+              </a:ext>
+            </a:extLst>
+          </p:cNvPr>
+          <p:cNvSpPr>
+            <a:spLocks noGrp="1" noRot="1" noChangeAspect="1" noMove="1" noResize="1" noEditPoints="1" noAdjustHandles="1" noChangeArrowheads="1" noChangeShapeType="1" noTextEdit="1"/>
+          </p:cNvSpPr>
+          <p:nvPr>
+            <p:extLst>
+              <p:ext uri="{386F3935-93C4-4BCD-93E2-E3B085C9AB24}">
+                <p16:designElem xmlns:p16="http://schemas.microsoft.com/office/powerpoint/2015/main" val="1"/>
+              </p:ext>
+            </p:extLst>
+          </p:nvPr>
+        </p:nvSpPr>
+        <p:spPr>
+          <a:xfrm rot="5400000">
+            <a:off x="759921" y="346791"/>
+            <a:ext cx="146304" cy="704088"/>
+          </a:xfrm>
+          <a:prstGeom prst="rect">
+            <a:avLst/>
+          </a:prstGeom>
+          <a:solidFill>
+            <a:schemeClr val="accent2"/>
+          </a:solidFill>
+          <a:ln>
+            <a:noFill/>
+          </a:ln>
+        </p:spPr>
+        <p:style>
+          <a:lnRef idx="2">
+            <a:schemeClr val="accent1">
+              <a:shade val="50000"/>
+            </a:schemeClr>
+          </a:lnRef>
+          <a:fillRef idx="1">
+            <a:schemeClr val="accent1"/>
+          </a:fillRef>
+          <a:effectRef idx="0">
+            <a:schemeClr val="accent1"/>
+          </a:effectRef>
+          <a:fontRef idx="minor">
+            <a:schemeClr val="lt1"/>
+          </a:fontRef>
+        </p:style>
+        <p:txBody>
+          <a:bodyPr rtlCol="0" anchor="ctr"/>
+          <a:lstStyle/>
           <a:p>
-            <a:pPr lvl="1"/>
-            <a:r>
-              <a:rPr lang="en-US" dirty="0"/>
-              <a:t>Implied by ACTION </a:t>
-            </a:r>
+            <a:pPr algn="ctr"/>
+            <a:endParaRPr lang="en-US">
+              <a:solidFill>
+                <a:prstClr val="white"/>
+              </a:solidFill>
+              <a:latin typeface="Calibri" panose="020F0502020204030204"/>
+            </a:endParaRPr>
           </a:p>
+        </p:txBody>
+      </p:sp>
+      <p:sp>
+        <p:nvSpPr>
+          <p:cNvPr id="16" name="Rectangle 15">
+            <a:extLst>
+              <a:ext uri="{FF2B5EF4-FFF2-40B4-BE49-F238E27FC236}">
+                <a16:creationId xmlns:a16="http://schemas.microsoft.com/office/drawing/2014/main" id="{08C9B587-E65E-4B52-B37C-ABEBB6E87928}"/>
+              </a:ext>
+              <a:ext uri="{C183D7F6-B498-43B3-948B-1728B52AA6E4}">
+                <adec:decorative xmlns:adec="http://schemas.microsoft.com/office/drawing/2017/decorative" val="1"/>
+              </a:ext>
+            </a:extLst>
+          </p:cNvPr>
+          <p:cNvSpPr>
+            <a:spLocks noGrp="1" noRot="1" noChangeAspect="1" noMove="1" noResize="1" noEditPoints="1" noAdjustHandles="1" noChangeArrowheads="1" noChangeShapeType="1" noTextEdit="1"/>
+          </p:cNvSpPr>
+          <p:nvPr>
+            <p:extLst>
+              <p:ext uri="{386F3935-93C4-4BCD-93E2-E3B085C9AB24}">
+                <p16:designElem xmlns:p16="http://schemas.microsoft.com/office/powerpoint/2015/main" val="1"/>
+              </p:ext>
+            </p:extLst>
+          </p:nvPr>
+        </p:nvSpPr>
+        <p:spPr>
+          <a:xfrm>
+            <a:off x="481029" y="4546920"/>
+            <a:ext cx="3977640" cy="18288"/>
+          </a:xfrm>
+          <a:prstGeom prst="rect">
+            <a:avLst/>
+          </a:prstGeom>
+          <a:solidFill>
+            <a:schemeClr val="tx1"/>
+          </a:solidFill>
+          <a:ln w="3175">
+            <a:noFill/>
+          </a:ln>
+          <a:effectLst/>
+        </p:spPr>
+        <p:style>
+          <a:lnRef idx="2">
+            <a:schemeClr val="accent1">
+              <a:shade val="50000"/>
+            </a:schemeClr>
+          </a:lnRef>
+          <a:fillRef idx="1">
+            <a:schemeClr val="accent1"/>
+          </a:fillRef>
+          <a:effectRef idx="0">
+            <a:schemeClr val="accent1"/>
+          </a:effectRef>
+          <a:fontRef idx="minor">
+            <a:schemeClr val="lt1"/>
+          </a:fontRef>
+        </p:style>
+        <p:txBody>
+          <a:bodyPr rtlCol="0" anchor="ctr"/>
+          <a:lstStyle/>
           <a:p>
-            <a:pPr marL="457200" lvl="1" indent="0">
+            <a:pPr marL="0" marR="0" lvl="0" indent="0" algn="ctr" defTabSz="914400" rtl="0" eaLnBrk="1" fontAlgn="auto" latinLnBrk="0" hangingPunct="1">
+              <a:lnSpc>
+                <a:spcPct val="100000"/>
+              </a:lnSpc>
+              <a:spcBef>
+                <a:spcPts val="0"/>
+              </a:spcBef>
+              <a:spcAft>
+                <a:spcPts val="0"/>
+              </a:spcAft>
+              <a:buClrTx/>
+              <a:buSzTx/>
+              <a:buFontTx/>
               <a:buNone/>
+              <a:tabLst/>
+              <a:defRPr/>
             </a:pPr>
-            <a:endParaRPr lang="en-US" dirty="0"/>
+            <a:endParaRPr kumimoji="0" lang="en-US" sz="1800" b="0" i="0" u="none" strike="noStrike" kern="1200" cap="none" spc="0" normalizeH="0" baseline="0" noProof="0">
+              <a:ln>
+                <a:noFill/>
+              </a:ln>
+              <a:solidFill>
+                <a:prstClr val="white"/>
+              </a:solidFill>
+              <a:effectLst/>
+              <a:uLnTx/>
+              <a:uFillTx/>
+              <a:latin typeface="Calibri" panose="020F0502020204030204"/>
+              <a:ea typeface="+mn-ea"/>
+              <a:cs typeface="+mn-cs"/>
+            </a:endParaRPr>
           </a:p>
         </p:txBody>
       </p:sp>
     </p:spTree>
     <p:extLst>
       <p:ext uri="{BB962C8B-B14F-4D97-AF65-F5344CB8AC3E}">
-        <p14:creationId xmlns:p14="http://schemas.microsoft.com/office/powerpoint/2010/main" val="1584489343"/>
+        <p14:creationId xmlns:p14="http://schemas.microsoft.com/office/powerpoint/2010/main" val="365864321"/>
       </p:ext>
     </p:extLst>
   </p:cSld>

</xml_diff>

<commit_message>
fixed error in consent calendar reference
</commit_message>
<xml_diff>
--- a/chico-specific/Chico presentation.pptx
+++ b/chico-specific/Chico presentation.pptx
@@ -27548,7 +27548,21 @@
                 <a:effectLst/>
                 <a:latin typeface="Helvetica Neue" panose="02000503000000020004" pitchFamily="2" charset="0"/>
               </a:rPr>
-              <a:t>n gross or without debate or amendment.” [41:34; my italics]</a:t>
+              <a:t>n gross or without debate or amendment.” [41:32</a:t>
+            </a:r>
+            <a:r>
+              <a:rPr lang="en-US">
+                <a:effectLst/>
+                <a:latin typeface="Helvetica Neue" panose="02000503000000020004" pitchFamily="2" charset="0"/>
+              </a:rPr>
+              <a:t>; original italics</a:t>
+            </a:r>
+            <a:r>
+              <a:rPr lang="en-US" dirty="0">
+                <a:effectLst/>
+                <a:latin typeface="Helvetica Neue" panose="02000503000000020004" pitchFamily="2" charset="0"/>
+              </a:rPr>
+              <a:t>]</a:t>
             </a:r>
             <a:endParaRPr lang="en-US" dirty="0"/>
           </a:p>

</xml_diff>